<commit_message>
Add article1 update with C# and rebranding
</commit_message>
<xml_diff>
--- a/diagram.pptx
+++ b/diagram.pptx
@@ -7,6 +7,8 @@
   <p:sldIdLst>
     <p:sldId id="256" r:id="rId2"/>
     <p:sldId id="265" r:id="rId3"/>
+    <p:sldId id="263" r:id="rId4"/>
+    <p:sldId id="264" r:id="rId5"/>
   </p:sldIdLst>
   <p:sldSz cx="9144000" cy="6858000" type="screen4x3"/>
   <p:notesSz cx="6858000" cy="9144000"/>
@@ -304,7 +306,7 @@
             <a:fld id="{1D8BD707-D9CF-40AE-B4C6-C98DA3205C09}" type="datetimeFigureOut">
               <a:rPr lang="en-US" smtClean="0"/>
               <a:pPr/>
-              <a:t>10/21/2024</a:t>
+              <a:t>10/24/2024</a:t>
             </a:fld>
             <a:endParaRPr lang="en-US"/>
           </a:p>
@@ -469,7 +471,7 @@
             <a:fld id="{1D8BD707-D9CF-40AE-B4C6-C98DA3205C09}" type="datetimeFigureOut">
               <a:rPr lang="en-US" smtClean="0"/>
               <a:pPr/>
-              <a:t>10/21/2024</a:t>
+              <a:t>10/24/2024</a:t>
             </a:fld>
             <a:endParaRPr lang="en-US"/>
           </a:p>
@@ -644,7 +646,7 @@
             <a:fld id="{1D8BD707-D9CF-40AE-B4C6-C98DA3205C09}" type="datetimeFigureOut">
               <a:rPr lang="en-US" smtClean="0"/>
               <a:pPr/>
-              <a:t>10/21/2024</a:t>
+              <a:t>10/24/2024</a:t>
             </a:fld>
             <a:endParaRPr lang="en-US"/>
           </a:p>
@@ -809,7 +811,7 @@
             <a:fld id="{1D8BD707-D9CF-40AE-B4C6-C98DA3205C09}" type="datetimeFigureOut">
               <a:rPr lang="en-US" smtClean="0"/>
               <a:pPr/>
-              <a:t>10/21/2024</a:t>
+              <a:t>10/24/2024</a:t>
             </a:fld>
             <a:endParaRPr lang="en-US"/>
           </a:p>
@@ -1051,7 +1053,7 @@
             <a:fld id="{1D8BD707-D9CF-40AE-B4C6-C98DA3205C09}" type="datetimeFigureOut">
               <a:rPr lang="en-US" smtClean="0"/>
               <a:pPr/>
-              <a:t>10/21/2024</a:t>
+              <a:t>10/24/2024</a:t>
             </a:fld>
             <a:endParaRPr lang="en-US"/>
           </a:p>
@@ -1333,7 +1335,7 @@
             <a:fld id="{1D8BD707-D9CF-40AE-B4C6-C98DA3205C09}" type="datetimeFigureOut">
               <a:rPr lang="en-US" smtClean="0"/>
               <a:pPr/>
-              <a:t>10/21/2024</a:t>
+              <a:t>10/24/2024</a:t>
             </a:fld>
             <a:endParaRPr lang="en-US"/>
           </a:p>
@@ -1749,7 +1751,7 @@
             <a:fld id="{1D8BD707-D9CF-40AE-B4C6-C98DA3205C09}" type="datetimeFigureOut">
               <a:rPr lang="en-US" smtClean="0"/>
               <a:pPr/>
-              <a:t>10/21/2024</a:t>
+              <a:t>10/24/2024</a:t>
             </a:fld>
             <a:endParaRPr lang="en-US"/>
           </a:p>
@@ -1863,7 +1865,7 @@
             <a:fld id="{1D8BD707-D9CF-40AE-B4C6-C98DA3205C09}" type="datetimeFigureOut">
               <a:rPr lang="en-US" smtClean="0"/>
               <a:pPr/>
-              <a:t>10/21/2024</a:t>
+              <a:t>10/24/2024</a:t>
             </a:fld>
             <a:endParaRPr lang="en-US"/>
           </a:p>
@@ -1955,7 +1957,7 @@
             <a:fld id="{1D8BD707-D9CF-40AE-B4C6-C98DA3205C09}" type="datetimeFigureOut">
               <a:rPr lang="en-US" smtClean="0"/>
               <a:pPr/>
-              <a:t>10/21/2024</a:t>
+              <a:t>10/24/2024</a:t>
             </a:fld>
             <a:endParaRPr lang="en-US"/>
           </a:p>
@@ -2227,7 +2229,7 @@
             <a:fld id="{1D8BD707-D9CF-40AE-B4C6-C98DA3205C09}" type="datetimeFigureOut">
               <a:rPr lang="en-US" smtClean="0"/>
               <a:pPr/>
-              <a:t>10/21/2024</a:t>
+              <a:t>10/24/2024</a:t>
             </a:fld>
             <a:endParaRPr lang="en-US"/>
           </a:p>
@@ -2476,7 +2478,7 @@
             <a:fld id="{1D8BD707-D9CF-40AE-B4C6-C98DA3205C09}" type="datetimeFigureOut">
               <a:rPr lang="en-US" smtClean="0"/>
               <a:pPr/>
-              <a:t>10/21/2024</a:t>
+              <a:t>10/24/2024</a:t>
             </a:fld>
             <a:endParaRPr lang="en-US"/>
           </a:p>
@@ -2684,7 +2686,7 @@
             <a:fld id="{1D8BD707-D9CF-40AE-B4C6-C98DA3205C09}" type="datetimeFigureOut">
               <a:rPr lang="en-US" smtClean="0"/>
               <a:pPr/>
-              <a:t>10/21/2024</a:t>
+              <a:t>10/24/2024</a:t>
             </a:fld>
             <a:endParaRPr lang="en-US"/>
           </a:p>
@@ -4409,6 +4411,2458 @@
 </p:sld>
 </file>
 
+<file path=ppt/slides/slide3.xml><?xml version="1.0" encoding="utf-8"?>
+<p:sld xmlns:a="http://schemas.openxmlformats.org/drawingml/2006/main" xmlns:r="http://schemas.openxmlformats.org/officeDocument/2006/relationships" xmlns:p="http://schemas.openxmlformats.org/presentationml/2006/main">
+  <p:cSld>
+    <p:spTree>
+      <p:nvGrpSpPr>
+        <p:cNvPr id="1" name=""/>
+        <p:cNvGrpSpPr/>
+        <p:nvPr/>
+      </p:nvGrpSpPr>
+      <p:grpSpPr>
+        <a:xfrm>
+          <a:off x="0" y="0"/>
+          <a:ext cx="0" cy="0"/>
+          <a:chOff x="0" y="0"/>
+          <a:chExt cx="0" cy="0"/>
+        </a:xfrm>
+      </p:grpSpPr>
+      <p:sp>
+        <p:nvSpPr>
+          <p:cNvPr id="43" name="Rectangle 42">
+            <a:extLst>
+              <a:ext uri="{FF2B5EF4-FFF2-40B4-BE49-F238E27FC236}">
+                <a16:creationId xmlns:a16="http://schemas.microsoft.com/office/drawing/2014/main" id="{D02B5E22-53D6-4104-8427-60E432B874A2}"/>
+              </a:ext>
+            </a:extLst>
+          </p:cNvPr>
+          <p:cNvSpPr/>
+          <p:nvPr/>
+        </p:nvSpPr>
+        <p:spPr>
+          <a:xfrm>
+            <a:off x="2941330" y="993711"/>
+            <a:ext cx="6202670" cy="4549839"/>
+          </a:xfrm>
+          <a:prstGeom prst="rect">
+            <a:avLst/>
+          </a:prstGeom>
+          <a:solidFill>
+            <a:schemeClr val="tx2">
+              <a:lumMod val="20000"/>
+              <a:lumOff val="80000"/>
+            </a:schemeClr>
+          </a:solidFill>
+          <a:ln>
+            <a:noFill/>
+          </a:ln>
+        </p:spPr>
+        <p:style>
+          <a:lnRef idx="2">
+            <a:schemeClr val="accent1">
+              <a:shade val="50000"/>
+            </a:schemeClr>
+          </a:lnRef>
+          <a:fillRef idx="1">
+            <a:schemeClr val="accent1"/>
+          </a:fillRef>
+          <a:effectRef idx="0">
+            <a:schemeClr val="accent1"/>
+          </a:effectRef>
+          <a:fontRef idx="minor">
+            <a:schemeClr val="lt1"/>
+          </a:fontRef>
+        </p:style>
+        <p:txBody>
+          <a:bodyPr rtlCol="0" anchor="ctr"/>
+          <a:lstStyle/>
+          <a:p>
+            <a:pPr algn="ctr"/>
+            <a:endParaRPr lang="en-US" sz="1350"/>
+          </a:p>
+        </p:txBody>
+      </p:sp>
+      <p:sp>
+        <p:nvSpPr>
+          <p:cNvPr id="42" name="Rectangle 41">
+            <a:extLst>
+              <a:ext uri="{FF2B5EF4-FFF2-40B4-BE49-F238E27FC236}">
+                <a16:creationId xmlns:a16="http://schemas.microsoft.com/office/drawing/2014/main" id="{65D83160-84A2-416C-BE50-1823DC127F90}"/>
+              </a:ext>
+            </a:extLst>
+          </p:cNvPr>
+          <p:cNvSpPr/>
+          <p:nvPr/>
+        </p:nvSpPr>
+        <p:spPr>
+          <a:xfrm>
+            <a:off x="1" y="993711"/>
+            <a:ext cx="2874131" cy="4549839"/>
+          </a:xfrm>
+          <a:prstGeom prst="rect">
+            <a:avLst/>
+          </a:prstGeom>
+          <a:solidFill>
+            <a:schemeClr val="accent6">
+              <a:lumMod val="40000"/>
+              <a:lumOff val="60000"/>
+            </a:schemeClr>
+          </a:solidFill>
+          <a:ln>
+            <a:noFill/>
+          </a:ln>
+        </p:spPr>
+        <p:style>
+          <a:lnRef idx="2">
+            <a:schemeClr val="accent1">
+              <a:shade val="50000"/>
+            </a:schemeClr>
+          </a:lnRef>
+          <a:fillRef idx="1">
+            <a:schemeClr val="accent1"/>
+          </a:fillRef>
+          <a:effectRef idx="0">
+            <a:schemeClr val="accent1"/>
+          </a:effectRef>
+          <a:fontRef idx="minor">
+            <a:schemeClr val="lt1"/>
+          </a:fontRef>
+        </p:style>
+        <p:txBody>
+          <a:bodyPr rtlCol="0" anchor="ctr"/>
+          <a:lstStyle/>
+          <a:p>
+            <a:pPr algn="ctr"/>
+            <a:endParaRPr lang="en-US" sz="1350"/>
+          </a:p>
+        </p:txBody>
+      </p:sp>
+      <p:sp>
+        <p:nvSpPr>
+          <p:cNvPr id="6" name="Cube 5">
+            <a:extLst>
+              <a:ext uri="{FF2B5EF4-FFF2-40B4-BE49-F238E27FC236}">
+                <a16:creationId xmlns:a16="http://schemas.microsoft.com/office/drawing/2014/main" id="{BE7B7AE3-7C7C-4AD0-B141-99D87D844439}"/>
+              </a:ext>
+            </a:extLst>
+          </p:cNvPr>
+          <p:cNvSpPr/>
+          <p:nvPr/>
+        </p:nvSpPr>
+        <p:spPr>
+          <a:xfrm>
+            <a:off x="337067" y="2197359"/>
+            <a:ext cx="1714500" cy="742950"/>
+          </a:xfrm>
+          <a:prstGeom prst="cube">
+            <a:avLst/>
+          </a:prstGeom>
+        </p:spPr>
+        <p:style>
+          <a:lnRef idx="2">
+            <a:schemeClr val="accent1">
+              <a:shade val="50000"/>
+            </a:schemeClr>
+          </a:lnRef>
+          <a:fillRef idx="1">
+            <a:schemeClr val="accent1"/>
+          </a:fillRef>
+          <a:effectRef idx="0">
+            <a:schemeClr val="accent1"/>
+          </a:effectRef>
+          <a:fontRef idx="minor">
+            <a:schemeClr val="lt1"/>
+          </a:fontRef>
+        </p:style>
+        <p:txBody>
+          <a:bodyPr rtlCol="0" anchor="ctr"/>
+          <a:lstStyle/>
+          <a:p>
+            <a:pPr algn="ctr"/>
+            <a:r>
+              <a:rPr lang="en-US" sz="1350" dirty="0"/>
+              <a:t>Real-Time Distribution System</a:t>
+            </a:r>
+          </a:p>
+        </p:txBody>
+      </p:sp>
+      <p:sp>
+        <p:nvSpPr>
+          <p:cNvPr id="7" name="Cube 6">
+            <a:extLst>
+              <a:ext uri="{FF2B5EF4-FFF2-40B4-BE49-F238E27FC236}">
+                <a16:creationId xmlns:a16="http://schemas.microsoft.com/office/drawing/2014/main" id="{F46A1EEA-1F1C-4E2A-A577-65E45CEE4DFC}"/>
+              </a:ext>
+            </a:extLst>
+          </p:cNvPr>
+          <p:cNvSpPr/>
+          <p:nvPr/>
+        </p:nvSpPr>
+        <p:spPr>
+          <a:xfrm>
+            <a:off x="2949641" y="2197359"/>
+            <a:ext cx="1390260" cy="742950"/>
+          </a:xfrm>
+          <a:prstGeom prst="cube">
+            <a:avLst/>
+          </a:prstGeom>
+        </p:spPr>
+        <p:style>
+          <a:lnRef idx="2">
+            <a:schemeClr val="accent1">
+              <a:shade val="50000"/>
+            </a:schemeClr>
+          </a:lnRef>
+          <a:fillRef idx="1">
+            <a:schemeClr val="accent1"/>
+          </a:fillRef>
+          <a:effectRef idx="0">
+            <a:schemeClr val="accent1"/>
+          </a:effectRef>
+          <a:fontRef idx="minor">
+            <a:schemeClr val="lt1"/>
+          </a:fontRef>
+        </p:style>
+        <p:txBody>
+          <a:bodyPr rtlCol="0" anchor="ctr"/>
+          <a:lstStyle/>
+          <a:p>
+            <a:pPr algn="ctr"/>
+            <a:r>
+              <a:rPr lang="en-US" sz="1350" dirty="0"/>
+              <a:t>Order </a:t>
+            </a:r>
+          </a:p>
+          <a:p>
+            <a:pPr algn="ctr"/>
+            <a:r>
+              <a:rPr lang="en-US" sz="1350" dirty="0"/>
+              <a:t>Management</a:t>
+            </a:r>
+          </a:p>
+        </p:txBody>
+      </p:sp>
+      <p:sp>
+        <p:nvSpPr>
+          <p:cNvPr id="8" name="Cube 7">
+            <a:extLst>
+              <a:ext uri="{FF2B5EF4-FFF2-40B4-BE49-F238E27FC236}">
+                <a16:creationId xmlns:a16="http://schemas.microsoft.com/office/drawing/2014/main" id="{4C4F33D7-8BDD-4693-9E29-0F53C27653C4}"/>
+              </a:ext>
+            </a:extLst>
+          </p:cNvPr>
+          <p:cNvSpPr/>
+          <p:nvPr/>
+        </p:nvSpPr>
+        <p:spPr>
+          <a:xfrm>
+            <a:off x="4534097" y="2197359"/>
+            <a:ext cx="1390260" cy="742950"/>
+          </a:xfrm>
+          <a:prstGeom prst="cube">
+            <a:avLst/>
+          </a:prstGeom>
+        </p:spPr>
+        <p:style>
+          <a:lnRef idx="2">
+            <a:schemeClr val="accent1">
+              <a:shade val="50000"/>
+            </a:schemeClr>
+          </a:lnRef>
+          <a:fillRef idx="1">
+            <a:schemeClr val="accent1"/>
+          </a:fillRef>
+          <a:effectRef idx="0">
+            <a:schemeClr val="accent1"/>
+          </a:effectRef>
+          <a:fontRef idx="minor">
+            <a:schemeClr val="lt1"/>
+          </a:fontRef>
+        </p:style>
+        <p:txBody>
+          <a:bodyPr rtlCol="0" anchor="ctr"/>
+          <a:lstStyle/>
+          <a:p>
+            <a:pPr algn="ctr"/>
+            <a:r>
+              <a:rPr lang="en-US" sz="1350" dirty="0"/>
+              <a:t>Risk</a:t>
+            </a:r>
+          </a:p>
+          <a:p>
+            <a:pPr algn="ctr"/>
+            <a:r>
+              <a:rPr lang="en-US" sz="1350" dirty="0"/>
+              <a:t>Management</a:t>
+            </a:r>
+          </a:p>
+        </p:txBody>
+      </p:sp>
+      <p:sp>
+        <p:nvSpPr>
+          <p:cNvPr id="9" name="Cube 8">
+            <a:extLst>
+              <a:ext uri="{FF2B5EF4-FFF2-40B4-BE49-F238E27FC236}">
+                <a16:creationId xmlns:a16="http://schemas.microsoft.com/office/drawing/2014/main" id="{817FD026-84E6-4EAA-B116-407D19A4A081}"/>
+              </a:ext>
+            </a:extLst>
+          </p:cNvPr>
+          <p:cNvSpPr/>
+          <p:nvPr/>
+        </p:nvSpPr>
+        <p:spPr>
+          <a:xfrm>
+            <a:off x="6083564" y="2190362"/>
+            <a:ext cx="1390260" cy="742950"/>
+          </a:xfrm>
+          <a:prstGeom prst="cube">
+            <a:avLst/>
+          </a:prstGeom>
+        </p:spPr>
+        <p:style>
+          <a:lnRef idx="2">
+            <a:schemeClr val="accent1">
+              <a:shade val="50000"/>
+            </a:schemeClr>
+          </a:lnRef>
+          <a:fillRef idx="1">
+            <a:schemeClr val="accent1"/>
+          </a:fillRef>
+          <a:effectRef idx="0">
+            <a:schemeClr val="accent1"/>
+          </a:effectRef>
+          <a:fontRef idx="minor">
+            <a:schemeClr val="lt1"/>
+          </a:fontRef>
+        </p:style>
+        <p:txBody>
+          <a:bodyPr rtlCol="0" anchor="ctr"/>
+          <a:lstStyle/>
+          <a:p>
+            <a:pPr algn="ctr"/>
+            <a:r>
+              <a:rPr lang="en-US" sz="1350" dirty="0"/>
+              <a:t>Portfolio </a:t>
+            </a:r>
+          </a:p>
+          <a:p>
+            <a:pPr algn="ctr"/>
+            <a:r>
+              <a:rPr lang="en-US" sz="1350" dirty="0"/>
+              <a:t>Management</a:t>
+            </a:r>
+          </a:p>
+        </p:txBody>
+      </p:sp>
+      <p:sp>
+        <p:nvSpPr>
+          <p:cNvPr id="10" name="Cube 9">
+            <a:extLst>
+              <a:ext uri="{FF2B5EF4-FFF2-40B4-BE49-F238E27FC236}">
+                <a16:creationId xmlns:a16="http://schemas.microsoft.com/office/drawing/2014/main" id="{B13047FB-F17A-4F05-A6CD-7D8162616AEF}"/>
+              </a:ext>
+            </a:extLst>
+          </p:cNvPr>
+          <p:cNvSpPr/>
+          <p:nvPr/>
+        </p:nvSpPr>
+        <p:spPr>
+          <a:xfrm>
+            <a:off x="7695429" y="2181031"/>
+            <a:ext cx="1390260" cy="742950"/>
+          </a:xfrm>
+          <a:prstGeom prst="cube">
+            <a:avLst/>
+          </a:prstGeom>
+        </p:spPr>
+        <p:style>
+          <a:lnRef idx="2">
+            <a:schemeClr val="accent1">
+              <a:shade val="50000"/>
+            </a:schemeClr>
+          </a:lnRef>
+          <a:fillRef idx="1">
+            <a:schemeClr val="accent1"/>
+          </a:fillRef>
+          <a:effectRef idx="0">
+            <a:schemeClr val="accent1"/>
+          </a:effectRef>
+          <a:fontRef idx="minor">
+            <a:schemeClr val="lt1"/>
+          </a:fontRef>
+        </p:style>
+        <p:txBody>
+          <a:bodyPr rtlCol="0" anchor="ctr"/>
+          <a:lstStyle/>
+          <a:p>
+            <a:pPr algn="ctr"/>
+            <a:r>
+              <a:rPr lang="en-US" sz="1350" dirty="0"/>
+              <a:t>Trading </a:t>
+            </a:r>
+          </a:p>
+          <a:p>
+            <a:pPr algn="ctr"/>
+            <a:r>
+              <a:rPr lang="en-US" sz="1350" dirty="0"/>
+              <a:t>Applications</a:t>
+            </a:r>
+          </a:p>
+        </p:txBody>
+      </p:sp>
+      <p:sp>
+        <p:nvSpPr>
+          <p:cNvPr id="11" name="Cube 10">
+            <a:extLst>
+              <a:ext uri="{FF2B5EF4-FFF2-40B4-BE49-F238E27FC236}">
+                <a16:creationId xmlns:a16="http://schemas.microsoft.com/office/drawing/2014/main" id="{B90F334E-63A5-4FF4-A7D5-A7D06943B433}"/>
+              </a:ext>
+            </a:extLst>
+          </p:cNvPr>
+          <p:cNvSpPr/>
+          <p:nvPr/>
+        </p:nvSpPr>
+        <p:spPr>
+          <a:xfrm>
+            <a:off x="1763493" y="4453036"/>
+            <a:ext cx="1053484" cy="742950"/>
+          </a:xfrm>
+          <a:prstGeom prst="cube">
+            <a:avLst/>
+          </a:prstGeom>
+          <a:solidFill>
+            <a:schemeClr val="accent6">
+              <a:lumMod val="75000"/>
+            </a:schemeClr>
+          </a:solidFill>
+          <a:ln>
+            <a:solidFill>
+              <a:schemeClr val="accent6">
+                <a:lumMod val="50000"/>
+              </a:schemeClr>
+            </a:solidFill>
+          </a:ln>
+        </p:spPr>
+        <p:style>
+          <a:lnRef idx="2">
+            <a:schemeClr val="accent1">
+              <a:shade val="50000"/>
+            </a:schemeClr>
+          </a:lnRef>
+          <a:fillRef idx="1">
+            <a:schemeClr val="accent1"/>
+          </a:fillRef>
+          <a:effectRef idx="0">
+            <a:schemeClr val="accent1"/>
+          </a:effectRef>
+          <a:fontRef idx="minor">
+            <a:schemeClr val="lt1"/>
+          </a:fontRef>
+        </p:style>
+        <p:txBody>
+          <a:bodyPr rtlCol="0" anchor="ctr"/>
+          <a:lstStyle/>
+          <a:p>
+            <a:pPr algn="ctr"/>
+            <a:r>
+              <a:rPr lang="en-US" sz="1350" dirty="0"/>
+              <a:t>ADS/ADH-ATS</a:t>
+            </a:r>
+          </a:p>
+        </p:txBody>
+      </p:sp>
+      <p:sp>
+        <p:nvSpPr>
+          <p:cNvPr id="12" name="Oval 11">
+            <a:extLst>
+              <a:ext uri="{FF2B5EF4-FFF2-40B4-BE49-F238E27FC236}">
+                <a16:creationId xmlns:a16="http://schemas.microsoft.com/office/drawing/2014/main" id="{020BE968-BB91-447C-AA69-7D2BDC90B9DC}"/>
+              </a:ext>
+            </a:extLst>
+          </p:cNvPr>
+          <p:cNvSpPr/>
+          <p:nvPr/>
+        </p:nvSpPr>
+        <p:spPr>
+          <a:xfrm>
+            <a:off x="3994376" y="4387287"/>
+            <a:ext cx="2000250" cy="742950"/>
+          </a:xfrm>
+          <a:prstGeom prst="ellipse">
+            <a:avLst/>
+          </a:prstGeom>
+          <a:solidFill>
+            <a:schemeClr val="accent6">
+              <a:lumMod val="75000"/>
+            </a:schemeClr>
+          </a:solidFill>
+          <a:ln>
+            <a:solidFill>
+              <a:schemeClr val="accent6">
+                <a:lumMod val="50000"/>
+              </a:schemeClr>
+            </a:solidFill>
+          </a:ln>
+        </p:spPr>
+        <p:style>
+          <a:lnRef idx="2">
+            <a:schemeClr val="accent1">
+              <a:shade val="50000"/>
+            </a:schemeClr>
+          </a:lnRef>
+          <a:fillRef idx="1">
+            <a:schemeClr val="accent1"/>
+          </a:fillRef>
+          <a:effectRef idx="0">
+            <a:schemeClr val="accent1"/>
+          </a:effectRef>
+          <a:fontRef idx="minor">
+            <a:schemeClr val="lt1"/>
+          </a:fontRef>
+        </p:style>
+        <p:txBody>
+          <a:bodyPr rot="0" spcFirstLastPara="0" vertOverflow="overflow" horzOverflow="overflow" vert="horz" wrap="square" lIns="68580" tIns="34290" rIns="68580" bIns="34290" numCol="1" spcCol="0" rtlCol="0" fromWordArt="0" anchor="ctr" anchorCtr="0" forceAA="0" compatLnSpc="1">
+            <a:prstTxWarp prst="textNoShape">
+              <a:avLst/>
+            </a:prstTxWarp>
+            <a:noAutofit/>
+          </a:bodyPr>
+          <a:lstStyle/>
+          <a:p>
+            <a:pPr algn="ctr"/>
+            <a:r>
+              <a:rPr lang="en-US" sz="1350" dirty="0"/>
+              <a:t>Back Office</a:t>
+            </a:r>
+          </a:p>
+        </p:txBody>
+      </p:sp>
+      <p:sp>
+        <p:nvSpPr>
+          <p:cNvPr id="13" name="Oval 12">
+            <a:extLst>
+              <a:ext uri="{FF2B5EF4-FFF2-40B4-BE49-F238E27FC236}">
+                <a16:creationId xmlns:a16="http://schemas.microsoft.com/office/drawing/2014/main" id="{F082BD17-FB19-478A-9140-DFB327EC476E}"/>
+              </a:ext>
+            </a:extLst>
+          </p:cNvPr>
+          <p:cNvSpPr/>
+          <p:nvPr/>
+        </p:nvSpPr>
+        <p:spPr>
+          <a:xfrm>
+            <a:off x="6560006" y="4387287"/>
+            <a:ext cx="2000250" cy="742950"/>
+          </a:xfrm>
+          <a:prstGeom prst="ellipse">
+            <a:avLst/>
+          </a:prstGeom>
+          <a:solidFill>
+            <a:schemeClr val="accent6">
+              <a:lumMod val="75000"/>
+            </a:schemeClr>
+          </a:solidFill>
+          <a:ln>
+            <a:solidFill>
+              <a:schemeClr val="accent6">
+                <a:lumMod val="50000"/>
+              </a:schemeClr>
+            </a:solidFill>
+          </a:ln>
+        </p:spPr>
+        <p:style>
+          <a:lnRef idx="2">
+            <a:schemeClr val="accent1">
+              <a:shade val="50000"/>
+            </a:schemeClr>
+          </a:lnRef>
+          <a:fillRef idx="1">
+            <a:schemeClr val="accent1"/>
+          </a:fillRef>
+          <a:effectRef idx="0">
+            <a:schemeClr val="accent1"/>
+          </a:effectRef>
+          <a:fontRef idx="minor">
+            <a:schemeClr val="lt1"/>
+          </a:fontRef>
+        </p:style>
+        <p:txBody>
+          <a:bodyPr rot="0" spcFirstLastPara="0" vertOverflow="overflow" horzOverflow="overflow" vert="horz" wrap="square" lIns="68580" tIns="34290" rIns="68580" bIns="34290" numCol="1" spcCol="0" rtlCol="0" fromWordArt="0" anchor="ctr" anchorCtr="0" forceAA="0" compatLnSpc="1">
+            <a:prstTxWarp prst="textNoShape">
+              <a:avLst/>
+            </a:prstTxWarp>
+            <a:noAutofit/>
+          </a:bodyPr>
+          <a:lstStyle/>
+          <a:p>
+            <a:pPr algn="ctr"/>
+            <a:r>
+              <a:rPr lang="en-US" sz="1350" dirty="0"/>
+              <a:t>Enterprise Users</a:t>
+            </a:r>
+          </a:p>
+        </p:txBody>
+      </p:sp>
+      <p:sp>
+        <p:nvSpPr>
+          <p:cNvPr id="15" name="Cylinder 14">
+            <a:extLst>
+              <a:ext uri="{FF2B5EF4-FFF2-40B4-BE49-F238E27FC236}">
+                <a16:creationId xmlns:a16="http://schemas.microsoft.com/office/drawing/2014/main" id="{5F09D213-3648-4D50-90BF-948D16071760}"/>
+              </a:ext>
+            </a:extLst>
+          </p:cNvPr>
+          <p:cNvSpPr/>
+          <p:nvPr/>
+        </p:nvSpPr>
+        <p:spPr>
+          <a:xfrm rot="5400000">
+            <a:off x="4272255" y="-762195"/>
+            <a:ext cx="485192" cy="8915402"/>
+          </a:xfrm>
+          <a:prstGeom prst="can">
+            <a:avLst/>
+          </a:prstGeom>
+          <a:solidFill>
+            <a:schemeClr val="accent3">
+              <a:lumMod val="50000"/>
+            </a:schemeClr>
+          </a:solidFill>
+          <a:ln>
+            <a:solidFill>
+              <a:schemeClr val="accent3">
+                <a:lumMod val="75000"/>
+              </a:schemeClr>
+            </a:solidFill>
+          </a:ln>
+        </p:spPr>
+        <p:style>
+          <a:lnRef idx="2">
+            <a:schemeClr val="accent1">
+              <a:shade val="50000"/>
+            </a:schemeClr>
+          </a:lnRef>
+          <a:fillRef idx="1">
+            <a:schemeClr val="accent1"/>
+          </a:fillRef>
+          <a:effectRef idx="0">
+            <a:schemeClr val="accent1"/>
+          </a:effectRef>
+          <a:fontRef idx="minor">
+            <a:schemeClr val="lt1"/>
+          </a:fontRef>
+        </p:style>
+        <p:txBody>
+          <a:bodyPr rtlCol="0" anchor="ctr"/>
+          <a:lstStyle/>
+          <a:p>
+            <a:pPr algn="ctr"/>
+            <a:endParaRPr lang="en-US" sz="1350"/>
+          </a:p>
+        </p:txBody>
+      </p:sp>
+      <p:sp>
+        <p:nvSpPr>
+          <p:cNvPr id="16" name="Cylinder 15">
+            <a:extLst>
+              <a:ext uri="{FF2B5EF4-FFF2-40B4-BE49-F238E27FC236}">
+                <a16:creationId xmlns:a16="http://schemas.microsoft.com/office/drawing/2014/main" id="{3B414E30-5694-43C2-8456-64853A77918D}"/>
+              </a:ext>
+            </a:extLst>
+          </p:cNvPr>
+          <p:cNvSpPr/>
+          <p:nvPr/>
+        </p:nvSpPr>
+        <p:spPr>
+          <a:xfrm>
+            <a:off x="914400" y="2940310"/>
+            <a:ext cx="400050" cy="602991"/>
+          </a:xfrm>
+          <a:prstGeom prst="can">
+            <a:avLst/>
+          </a:prstGeom>
+          <a:solidFill>
+            <a:schemeClr val="accent3">
+              <a:lumMod val="75000"/>
+            </a:schemeClr>
+          </a:solidFill>
+          <a:ln>
+            <a:solidFill>
+              <a:schemeClr val="accent3">
+                <a:lumMod val="50000"/>
+              </a:schemeClr>
+            </a:solidFill>
+          </a:ln>
+        </p:spPr>
+        <p:style>
+          <a:lnRef idx="2">
+            <a:schemeClr val="accent1">
+              <a:shade val="50000"/>
+            </a:schemeClr>
+          </a:lnRef>
+          <a:fillRef idx="1">
+            <a:schemeClr val="accent1"/>
+          </a:fillRef>
+          <a:effectRef idx="0">
+            <a:schemeClr val="accent1"/>
+          </a:effectRef>
+          <a:fontRef idx="minor">
+            <a:schemeClr val="lt1"/>
+          </a:fontRef>
+        </p:style>
+        <p:txBody>
+          <a:bodyPr rtlCol="0" anchor="ctr"/>
+          <a:lstStyle/>
+          <a:p>
+            <a:pPr algn="ctr"/>
+            <a:endParaRPr lang="en-US" sz="1350"/>
+          </a:p>
+        </p:txBody>
+      </p:sp>
+      <p:sp>
+        <p:nvSpPr>
+          <p:cNvPr id="17" name="Cylinder 16">
+            <a:extLst>
+              <a:ext uri="{FF2B5EF4-FFF2-40B4-BE49-F238E27FC236}">
+                <a16:creationId xmlns:a16="http://schemas.microsoft.com/office/drawing/2014/main" id="{3F3768C3-F619-4386-90A5-7B54B16B1D21}"/>
+              </a:ext>
+            </a:extLst>
+          </p:cNvPr>
+          <p:cNvSpPr/>
+          <p:nvPr/>
+        </p:nvSpPr>
+        <p:spPr>
+          <a:xfrm>
+            <a:off x="3368069" y="2903279"/>
+            <a:ext cx="400050" cy="602991"/>
+          </a:xfrm>
+          <a:prstGeom prst="can">
+            <a:avLst/>
+          </a:prstGeom>
+          <a:solidFill>
+            <a:schemeClr val="accent3">
+              <a:lumMod val="75000"/>
+            </a:schemeClr>
+          </a:solidFill>
+          <a:ln>
+            <a:solidFill>
+              <a:schemeClr val="accent3">
+                <a:lumMod val="50000"/>
+              </a:schemeClr>
+            </a:solidFill>
+          </a:ln>
+        </p:spPr>
+        <p:style>
+          <a:lnRef idx="2">
+            <a:schemeClr val="accent1">
+              <a:shade val="50000"/>
+            </a:schemeClr>
+          </a:lnRef>
+          <a:fillRef idx="1">
+            <a:schemeClr val="accent1"/>
+          </a:fillRef>
+          <a:effectRef idx="0">
+            <a:schemeClr val="accent1"/>
+          </a:effectRef>
+          <a:fontRef idx="minor">
+            <a:schemeClr val="lt1"/>
+          </a:fontRef>
+        </p:style>
+        <p:txBody>
+          <a:bodyPr rot="0" spcFirstLastPara="0" vertOverflow="overflow" horzOverflow="overflow" vert="horz" wrap="square" lIns="68580" tIns="34290" rIns="68580" bIns="34290" numCol="1" spcCol="0" rtlCol="0" fromWordArt="0" anchor="ctr" anchorCtr="0" forceAA="0" compatLnSpc="1">
+            <a:prstTxWarp prst="textNoShape">
+              <a:avLst/>
+            </a:prstTxWarp>
+            <a:noAutofit/>
+          </a:bodyPr>
+          <a:lstStyle/>
+          <a:p>
+            <a:pPr algn="ctr"/>
+            <a:endParaRPr lang="en-US" sz="1350"/>
+          </a:p>
+        </p:txBody>
+      </p:sp>
+      <p:sp>
+        <p:nvSpPr>
+          <p:cNvPr id="18" name="Cylinder 17">
+            <a:extLst>
+              <a:ext uri="{FF2B5EF4-FFF2-40B4-BE49-F238E27FC236}">
+                <a16:creationId xmlns:a16="http://schemas.microsoft.com/office/drawing/2014/main" id="{505FAD3F-C414-4165-B47D-BF9B5B963413}"/>
+              </a:ext>
+            </a:extLst>
+          </p:cNvPr>
+          <p:cNvSpPr/>
+          <p:nvPr/>
+        </p:nvSpPr>
+        <p:spPr>
+          <a:xfrm>
+            <a:off x="4938822" y="2886659"/>
+            <a:ext cx="400050" cy="602991"/>
+          </a:xfrm>
+          <a:prstGeom prst="can">
+            <a:avLst/>
+          </a:prstGeom>
+          <a:solidFill>
+            <a:schemeClr val="accent3">
+              <a:lumMod val="75000"/>
+            </a:schemeClr>
+          </a:solidFill>
+          <a:ln>
+            <a:solidFill>
+              <a:schemeClr val="accent3">
+                <a:lumMod val="50000"/>
+              </a:schemeClr>
+            </a:solidFill>
+          </a:ln>
+        </p:spPr>
+        <p:style>
+          <a:lnRef idx="2">
+            <a:schemeClr val="accent1">
+              <a:shade val="50000"/>
+            </a:schemeClr>
+          </a:lnRef>
+          <a:fillRef idx="1">
+            <a:schemeClr val="accent1"/>
+          </a:fillRef>
+          <a:effectRef idx="0">
+            <a:schemeClr val="accent1"/>
+          </a:effectRef>
+          <a:fontRef idx="minor">
+            <a:schemeClr val="lt1"/>
+          </a:fontRef>
+        </p:style>
+        <p:txBody>
+          <a:bodyPr rot="0" spcFirstLastPara="0" vertOverflow="overflow" horzOverflow="overflow" vert="horz" wrap="square" lIns="68580" tIns="34290" rIns="68580" bIns="34290" numCol="1" spcCol="0" rtlCol="0" fromWordArt="0" anchor="ctr" anchorCtr="0" forceAA="0" compatLnSpc="1">
+            <a:prstTxWarp prst="textNoShape">
+              <a:avLst/>
+            </a:prstTxWarp>
+            <a:noAutofit/>
+          </a:bodyPr>
+          <a:lstStyle/>
+          <a:p>
+            <a:pPr algn="ctr"/>
+            <a:endParaRPr lang="en-US" sz="1350"/>
+          </a:p>
+        </p:txBody>
+      </p:sp>
+      <p:sp>
+        <p:nvSpPr>
+          <p:cNvPr id="19" name="Cylinder 18">
+            <a:extLst>
+              <a:ext uri="{FF2B5EF4-FFF2-40B4-BE49-F238E27FC236}">
+                <a16:creationId xmlns:a16="http://schemas.microsoft.com/office/drawing/2014/main" id="{42E205B5-A534-457D-8F81-BDABCBCFDE4E}"/>
+              </a:ext>
+            </a:extLst>
+          </p:cNvPr>
+          <p:cNvSpPr/>
+          <p:nvPr/>
+        </p:nvSpPr>
+        <p:spPr>
+          <a:xfrm>
+            <a:off x="6469616" y="2903279"/>
+            <a:ext cx="400050" cy="602991"/>
+          </a:xfrm>
+          <a:prstGeom prst="can">
+            <a:avLst/>
+          </a:prstGeom>
+          <a:solidFill>
+            <a:schemeClr val="accent3">
+              <a:lumMod val="75000"/>
+            </a:schemeClr>
+          </a:solidFill>
+          <a:ln>
+            <a:solidFill>
+              <a:schemeClr val="accent3">
+                <a:lumMod val="50000"/>
+              </a:schemeClr>
+            </a:solidFill>
+          </a:ln>
+        </p:spPr>
+        <p:style>
+          <a:lnRef idx="2">
+            <a:schemeClr val="accent1">
+              <a:shade val="50000"/>
+            </a:schemeClr>
+          </a:lnRef>
+          <a:fillRef idx="1">
+            <a:schemeClr val="accent1"/>
+          </a:fillRef>
+          <a:effectRef idx="0">
+            <a:schemeClr val="accent1"/>
+          </a:effectRef>
+          <a:fontRef idx="minor">
+            <a:schemeClr val="lt1"/>
+          </a:fontRef>
+        </p:style>
+        <p:txBody>
+          <a:bodyPr rot="0" spcFirstLastPara="0" vertOverflow="overflow" horzOverflow="overflow" vert="horz" wrap="square" lIns="68580" tIns="34290" rIns="68580" bIns="34290" numCol="1" spcCol="0" rtlCol="0" fromWordArt="0" anchor="ctr" anchorCtr="0" forceAA="0" compatLnSpc="1">
+            <a:prstTxWarp prst="textNoShape">
+              <a:avLst/>
+            </a:prstTxWarp>
+            <a:noAutofit/>
+          </a:bodyPr>
+          <a:lstStyle/>
+          <a:p>
+            <a:pPr algn="ctr"/>
+            <a:endParaRPr lang="en-US" sz="1350"/>
+          </a:p>
+        </p:txBody>
+      </p:sp>
+      <p:sp>
+        <p:nvSpPr>
+          <p:cNvPr id="20" name="Cylinder 19">
+            <a:extLst>
+              <a:ext uri="{FF2B5EF4-FFF2-40B4-BE49-F238E27FC236}">
+                <a16:creationId xmlns:a16="http://schemas.microsoft.com/office/drawing/2014/main" id="{7914D27D-EA80-4276-BE65-27E939FE5D33}"/>
+              </a:ext>
+            </a:extLst>
+          </p:cNvPr>
+          <p:cNvSpPr/>
+          <p:nvPr/>
+        </p:nvSpPr>
+        <p:spPr>
+          <a:xfrm>
+            <a:off x="8088478" y="2895115"/>
+            <a:ext cx="400050" cy="602991"/>
+          </a:xfrm>
+          <a:prstGeom prst="can">
+            <a:avLst/>
+          </a:prstGeom>
+          <a:solidFill>
+            <a:schemeClr val="accent3">
+              <a:lumMod val="75000"/>
+            </a:schemeClr>
+          </a:solidFill>
+          <a:ln>
+            <a:solidFill>
+              <a:schemeClr val="accent3">
+                <a:lumMod val="50000"/>
+              </a:schemeClr>
+            </a:solidFill>
+          </a:ln>
+        </p:spPr>
+        <p:style>
+          <a:lnRef idx="2">
+            <a:schemeClr val="accent1">
+              <a:shade val="50000"/>
+            </a:schemeClr>
+          </a:lnRef>
+          <a:fillRef idx="1">
+            <a:schemeClr val="accent1"/>
+          </a:fillRef>
+          <a:effectRef idx="0">
+            <a:schemeClr val="accent1"/>
+          </a:effectRef>
+          <a:fontRef idx="minor">
+            <a:schemeClr val="lt1"/>
+          </a:fontRef>
+        </p:style>
+        <p:txBody>
+          <a:bodyPr rot="0" spcFirstLastPara="0" vertOverflow="overflow" horzOverflow="overflow" vert="horz" wrap="square" lIns="68580" tIns="34290" rIns="68580" bIns="34290" numCol="1" spcCol="0" rtlCol="0" fromWordArt="0" anchor="ctr" anchorCtr="0" forceAA="0" compatLnSpc="1">
+            <a:prstTxWarp prst="textNoShape">
+              <a:avLst/>
+            </a:prstTxWarp>
+            <a:noAutofit/>
+          </a:bodyPr>
+          <a:lstStyle/>
+          <a:p>
+            <a:pPr algn="ctr"/>
+            <a:endParaRPr lang="en-US" sz="1350"/>
+          </a:p>
+        </p:txBody>
+      </p:sp>
+      <p:sp>
+        <p:nvSpPr>
+          <p:cNvPr id="21" name="Cylinder 20">
+            <a:extLst>
+              <a:ext uri="{FF2B5EF4-FFF2-40B4-BE49-F238E27FC236}">
+                <a16:creationId xmlns:a16="http://schemas.microsoft.com/office/drawing/2014/main" id="{72FAC68B-3178-46EE-8083-DF07887F9EBF}"/>
+              </a:ext>
+            </a:extLst>
+          </p:cNvPr>
+          <p:cNvSpPr/>
+          <p:nvPr/>
+        </p:nvSpPr>
+        <p:spPr>
+          <a:xfrm rot="10800000">
+            <a:off x="4765612" y="3864041"/>
+            <a:ext cx="400050" cy="602991"/>
+          </a:xfrm>
+          <a:prstGeom prst="can">
+            <a:avLst/>
+          </a:prstGeom>
+          <a:solidFill>
+            <a:schemeClr val="accent3">
+              <a:lumMod val="75000"/>
+            </a:schemeClr>
+          </a:solidFill>
+          <a:ln>
+            <a:solidFill>
+              <a:schemeClr val="accent3">
+                <a:lumMod val="50000"/>
+              </a:schemeClr>
+            </a:solidFill>
+          </a:ln>
+        </p:spPr>
+        <p:style>
+          <a:lnRef idx="2">
+            <a:schemeClr val="accent1">
+              <a:shade val="50000"/>
+            </a:schemeClr>
+          </a:lnRef>
+          <a:fillRef idx="1">
+            <a:schemeClr val="accent1"/>
+          </a:fillRef>
+          <a:effectRef idx="0">
+            <a:schemeClr val="accent1"/>
+          </a:effectRef>
+          <a:fontRef idx="minor">
+            <a:schemeClr val="lt1"/>
+          </a:fontRef>
+        </p:style>
+        <p:txBody>
+          <a:bodyPr rot="0" spcFirstLastPara="0" vertOverflow="overflow" horzOverflow="overflow" vert="horz" wrap="square" lIns="68580" tIns="34290" rIns="68580" bIns="34290" numCol="1" spcCol="0" rtlCol="0" fromWordArt="0" anchor="ctr" anchorCtr="0" forceAA="0" compatLnSpc="1">
+            <a:prstTxWarp prst="textNoShape">
+              <a:avLst/>
+            </a:prstTxWarp>
+            <a:noAutofit/>
+          </a:bodyPr>
+          <a:lstStyle/>
+          <a:p>
+            <a:pPr algn="ctr"/>
+            <a:endParaRPr lang="en-US" sz="1350"/>
+          </a:p>
+        </p:txBody>
+      </p:sp>
+      <p:sp>
+        <p:nvSpPr>
+          <p:cNvPr id="22" name="Cylinder 21">
+            <a:extLst>
+              <a:ext uri="{FF2B5EF4-FFF2-40B4-BE49-F238E27FC236}">
+                <a16:creationId xmlns:a16="http://schemas.microsoft.com/office/drawing/2014/main" id="{F84DA77E-080B-427A-9CCA-577D297EDF28}"/>
+              </a:ext>
+            </a:extLst>
+          </p:cNvPr>
+          <p:cNvSpPr/>
+          <p:nvPr/>
+        </p:nvSpPr>
+        <p:spPr>
+          <a:xfrm rot="10800000">
+            <a:off x="7273799" y="3857335"/>
+            <a:ext cx="400050" cy="602991"/>
+          </a:xfrm>
+          <a:prstGeom prst="can">
+            <a:avLst/>
+          </a:prstGeom>
+          <a:solidFill>
+            <a:schemeClr val="accent3">
+              <a:lumMod val="75000"/>
+            </a:schemeClr>
+          </a:solidFill>
+          <a:ln>
+            <a:solidFill>
+              <a:schemeClr val="accent3">
+                <a:lumMod val="50000"/>
+              </a:schemeClr>
+            </a:solidFill>
+          </a:ln>
+        </p:spPr>
+        <p:style>
+          <a:lnRef idx="2">
+            <a:schemeClr val="accent1">
+              <a:shade val="50000"/>
+            </a:schemeClr>
+          </a:lnRef>
+          <a:fillRef idx="1">
+            <a:schemeClr val="accent1"/>
+          </a:fillRef>
+          <a:effectRef idx="0">
+            <a:schemeClr val="accent1"/>
+          </a:effectRef>
+          <a:fontRef idx="minor">
+            <a:schemeClr val="lt1"/>
+          </a:fontRef>
+        </p:style>
+        <p:txBody>
+          <a:bodyPr rot="0" spcFirstLastPara="0" vertOverflow="overflow" horzOverflow="overflow" vert="horz" wrap="square" lIns="68580" tIns="34290" rIns="68580" bIns="34290" numCol="1" spcCol="0" rtlCol="0" fromWordArt="0" anchor="ctr" anchorCtr="0" forceAA="0" compatLnSpc="1">
+            <a:prstTxWarp prst="textNoShape">
+              <a:avLst/>
+            </a:prstTxWarp>
+            <a:noAutofit/>
+          </a:bodyPr>
+          <a:lstStyle/>
+          <a:p>
+            <a:pPr algn="ctr"/>
+            <a:endParaRPr lang="en-US" sz="1350"/>
+          </a:p>
+        </p:txBody>
+      </p:sp>
+      <p:sp>
+        <p:nvSpPr>
+          <p:cNvPr id="23" name="Cylinder 22">
+            <a:extLst>
+              <a:ext uri="{FF2B5EF4-FFF2-40B4-BE49-F238E27FC236}">
+                <a16:creationId xmlns:a16="http://schemas.microsoft.com/office/drawing/2014/main" id="{839584B9-4F4C-4376-A850-EC71431DA896}"/>
+              </a:ext>
+            </a:extLst>
+          </p:cNvPr>
+          <p:cNvSpPr/>
+          <p:nvPr/>
+        </p:nvSpPr>
+        <p:spPr>
+          <a:xfrm rot="10800000">
+            <a:off x="2050983" y="3892907"/>
+            <a:ext cx="400050" cy="602991"/>
+          </a:xfrm>
+          <a:prstGeom prst="can">
+            <a:avLst/>
+          </a:prstGeom>
+          <a:solidFill>
+            <a:schemeClr val="accent3">
+              <a:lumMod val="75000"/>
+            </a:schemeClr>
+          </a:solidFill>
+          <a:ln>
+            <a:solidFill>
+              <a:schemeClr val="accent3">
+                <a:lumMod val="50000"/>
+              </a:schemeClr>
+            </a:solidFill>
+          </a:ln>
+        </p:spPr>
+        <p:style>
+          <a:lnRef idx="2">
+            <a:schemeClr val="accent1">
+              <a:shade val="50000"/>
+            </a:schemeClr>
+          </a:lnRef>
+          <a:fillRef idx="1">
+            <a:schemeClr val="accent1"/>
+          </a:fillRef>
+          <a:effectRef idx="0">
+            <a:schemeClr val="accent1"/>
+          </a:effectRef>
+          <a:fontRef idx="minor">
+            <a:schemeClr val="lt1"/>
+          </a:fontRef>
+        </p:style>
+        <p:txBody>
+          <a:bodyPr rot="0" spcFirstLastPara="0" vertOverflow="overflow" horzOverflow="overflow" vert="horz" wrap="square" lIns="68580" tIns="34290" rIns="68580" bIns="34290" numCol="1" spcCol="0" rtlCol="0" fromWordArt="0" anchor="ctr" anchorCtr="0" forceAA="0" compatLnSpc="1">
+            <a:prstTxWarp prst="textNoShape">
+              <a:avLst/>
+            </a:prstTxWarp>
+            <a:noAutofit/>
+          </a:bodyPr>
+          <a:lstStyle/>
+          <a:p>
+            <a:pPr algn="ctr"/>
+            <a:endParaRPr lang="en-US" sz="1350"/>
+          </a:p>
+        </p:txBody>
+      </p:sp>
+      <p:sp>
+        <p:nvSpPr>
+          <p:cNvPr id="25" name="Cube 24">
+            <a:extLst>
+              <a:ext uri="{FF2B5EF4-FFF2-40B4-BE49-F238E27FC236}">
+                <a16:creationId xmlns:a16="http://schemas.microsoft.com/office/drawing/2014/main" id="{314995DE-68F9-430F-A2B4-721E102CF029}"/>
+              </a:ext>
+            </a:extLst>
+          </p:cNvPr>
+          <p:cNvSpPr/>
+          <p:nvPr/>
+        </p:nvSpPr>
+        <p:spPr>
+          <a:xfrm>
+            <a:off x="64729" y="4457700"/>
+            <a:ext cx="1586204" cy="758845"/>
+          </a:xfrm>
+          <a:prstGeom prst="cube">
+            <a:avLst/>
+          </a:prstGeom>
+          <a:solidFill>
+            <a:schemeClr val="accent6">
+              <a:lumMod val="75000"/>
+            </a:schemeClr>
+          </a:solidFill>
+          <a:ln>
+            <a:solidFill>
+              <a:schemeClr val="accent6">
+                <a:lumMod val="50000"/>
+              </a:schemeClr>
+            </a:solidFill>
+          </a:ln>
+        </p:spPr>
+        <p:style>
+          <a:lnRef idx="2">
+            <a:schemeClr val="accent1">
+              <a:shade val="50000"/>
+            </a:schemeClr>
+          </a:lnRef>
+          <a:fillRef idx="1">
+            <a:schemeClr val="accent1"/>
+          </a:fillRef>
+          <a:effectRef idx="0">
+            <a:schemeClr val="accent1"/>
+          </a:effectRef>
+          <a:fontRef idx="minor">
+            <a:schemeClr val="lt1"/>
+          </a:fontRef>
+        </p:style>
+        <p:txBody>
+          <a:bodyPr rot="0" spcFirstLastPara="0" vertOverflow="overflow" horzOverflow="overflow" vert="horz" wrap="square" lIns="68580" tIns="34290" rIns="68580" bIns="34290" numCol="1" spcCol="0" rtlCol="0" fromWordArt="0" anchor="ctr" anchorCtr="0" forceAA="0" compatLnSpc="1">
+            <a:prstTxWarp prst="textNoShape">
+              <a:avLst/>
+            </a:prstTxWarp>
+            <a:noAutofit/>
+          </a:bodyPr>
+          <a:lstStyle/>
+          <a:p>
+            <a:pPr algn="ctr"/>
+            <a:r>
+              <a:rPr lang="en-US" sz="1350" dirty="0"/>
+              <a:t>Workspace</a:t>
+            </a:r>
+          </a:p>
+        </p:txBody>
+      </p:sp>
+      <p:sp>
+        <p:nvSpPr>
+          <p:cNvPr id="26" name="Cylinder 25">
+            <a:extLst>
+              <a:ext uri="{FF2B5EF4-FFF2-40B4-BE49-F238E27FC236}">
+                <a16:creationId xmlns:a16="http://schemas.microsoft.com/office/drawing/2014/main" id="{FF64B89E-3006-484E-8C0C-67E05C845E5E}"/>
+              </a:ext>
+            </a:extLst>
+          </p:cNvPr>
+          <p:cNvSpPr/>
+          <p:nvPr/>
+        </p:nvSpPr>
+        <p:spPr>
+          <a:xfrm rot="10800000">
+            <a:off x="383719" y="3923231"/>
+            <a:ext cx="400050" cy="602991"/>
+          </a:xfrm>
+          <a:prstGeom prst="can">
+            <a:avLst/>
+          </a:prstGeom>
+          <a:solidFill>
+            <a:schemeClr val="accent3">
+              <a:lumMod val="75000"/>
+            </a:schemeClr>
+          </a:solidFill>
+          <a:ln>
+            <a:solidFill>
+              <a:schemeClr val="accent3">
+                <a:lumMod val="50000"/>
+              </a:schemeClr>
+            </a:solidFill>
+          </a:ln>
+        </p:spPr>
+        <p:style>
+          <a:lnRef idx="2">
+            <a:schemeClr val="accent1">
+              <a:shade val="50000"/>
+            </a:schemeClr>
+          </a:lnRef>
+          <a:fillRef idx="1">
+            <a:schemeClr val="accent1"/>
+          </a:fillRef>
+          <a:effectRef idx="0">
+            <a:schemeClr val="accent1"/>
+          </a:effectRef>
+          <a:fontRef idx="minor">
+            <a:schemeClr val="lt1"/>
+          </a:fontRef>
+        </p:style>
+        <p:txBody>
+          <a:bodyPr rot="0" spcFirstLastPara="0" vertOverflow="overflow" horzOverflow="overflow" vert="horz" wrap="square" lIns="68580" tIns="34290" rIns="68580" bIns="34290" numCol="1" spcCol="0" rtlCol="0" fromWordArt="0" anchor="ctr" anchorCtr="0" forceAA="0" compatLnSpc="1">
+            <a:prstTxWarp prst="textNoShape">
+              <a:avLst/>
+            </a:prstTxWarp>
+            <a:noAutofit/>
+          </a:bodyPr>
+          <a:lstStyle/>
+          <a:p>
+            <a:pPr algn="ctr"/>
+            <a:endParaRPr lang="en-US" sz="1350"/>
+          </a:p>
+        </p:txBody>
+      </p:sp>
+      <p:cxnSp>
+        <p:nvCxnSpPr>
+          <p:cNvPr id="3" name="Straight Connector 2">
+            <a:extLst>
+              <a:ext uri="{FF2B5EF4-FFF2-40B4-BE49-F238E27FC236}">
+                <a16:creationId xmlns:a16="http://schemas.microsoft.com/office/drawing/2014/main" id="{A1BA2A47-1B52-4308-BECE-69E253D71DA1}"/>
+              </a:ext>
+            </a:extLst>
+          </p:cNvPr>
+          <p:cNvCxnSpPr>
+            <a:cxnSpLocks/>
+          </p:cNvCxnSpPr>
+          <p:nvPr/>
+        </p:nvCxnSpPr>
+        <p:spPr>
+          <a:xfrm>
+            <a:off x="583743" y="3714752"/>
+            <a:ext cx="7704760" cy="4080"/>
+          </a:xfrm>
+          <a:prstGeom prst="line">
+            <a:avLst/>
+          </a:prstGeom>
+          <a:ln w="19050" cap="flat" cmpd="sng" algn="ctr">
+            <a:solidFill>
+              <a:srgbClr val="FFFF00"/>
+            </a:solidFill>
+            <a:prstDash val="sysDot"/>
+            <a:round/>
+            <a:headEnd type="none" w="med" len="med"/>
+            <a:tailEnd type="none" w="med" len="med"/>
+          </a:ln>
+        </p:spPr>
+        <p:style>
+          <a:lnRef idx="0">
+            <a:scrgbClr r="0" g="0" b="0"/>
+          </a:lnRef>
+          <a:fillRef idx="0">
+            <a:scrgbClr r="0" g="0" b="0"/>
+          </a:fillRef>
+          <a:effectRef idx="0">
+            <a:scrgbClr r="0" g="0" b="0"/>
+          </a:effectRef>
+          <a:fontRef idx="minor">
+            <a:schemeClr val="tx1"/>
+          </a:fontRef>
+        </p:style>
+      </p:cxnSp>
+      <p:cxnSp>
+        <p:nvCxnSpPr>
+          <p:cNvPr id="27" name="Straight Connector 26">
+            <a:extLst>
+              <a:ext uri="{FF2B5EF4-FFF2-40B4-BE49-F238E27FC236}">
+                <a16:creationId xmlns:a16="http://schemas.microsoft.com/office/drawing/2014/main" id="{847A251C-C1D1-47D9-9042-89307C1E9961}"/>
+              </a:ext>
+            </a:extLst>
+          </p:cNvPr>
+          <p:cNvCxnSpPr>
+            <a:cxnSpLocks/>
+            <a:stCxn id="26" idx="0"/>
+          </p:cNvCxnSpPr>
+          <p:nvPr/>
+        </p:nvCxnSpPr>
+        <p:spPr>
+          <a:xfrm flipV="1">
+            <a:off x="583744" y="3714751"/>
+            <a:ext cx="0" cy="711459"/>
+          </a:xfrm>
+          <a:prstGeom prst="line">
+            <a:avLst/>
+          </a:prstGeom>
+          <a:ln w="19050" cap="flat" cmpd="sng" algn="ctr">
+            <a:solidFill>
+              <a:srgbClr val="FFFF00"/>
+            </a:solidFill>
+            <a:prstDash val="sysDot"/>
+            <a:round/>
+            <a:headEnd type="none" w="med" len="med"/>
+            <a:tailEnd type="none" w="med" len="med"/>
+          </a:ln>
+        </p:spPr>
+        <p:style>
+          <a:lnRef idx="0">
+            <a:scrgbClr r="0" g="0" b="0"/>
+          </a:lnRef>
+          <a:fillRef idx="0">
+            <a:scrgbClr r="0" g="0" b="0"/>
+          </a:fillRef>
+          <a:effectRef idx="0">
+            <a:scrgbClr r="0" g="0" b="0"/>
+          </a:effectRef>
+          <a:fontRef idx="minor">
+            <a:schemeClr val="tx1"/>
+          </a:fontRef>
+        </p:style>
+      </p:cxnSp>
+      <p:cxnSp>
+        <p:nvCxnSpPr>
+          <p:cNvPr id="33" name="Straight Connector 32">
+            <a:extLst>
+              <a:ext uri="{FF2B5EF4-FFF2-40B4-BE49-F238E27FC236}">
+                <a16:creationId xmlns:a16="http://schemas.microsoft.com/office/drawing/2014/main" id="{F34B15C7-19E8-4A58-95C3-78BA4B358318}"/>
+              </a:ext>
+            </a:extLst>
+          </p:cNvPr>
+          <p:cNvCxnSpPr>
+            <a:cxnSpLocks/>
+          </p:cNvCxnSpPr>
+          <p:nvPr/>
+        </p:nvCxnSpPr>
+        <p:spPr>
+          <a:xfrm flipV="1">
+            <a:off x="2256253" y="3714750"/>
+            <a:ext cx="0" cy="711459"/>
+          </a:xfrm>
+          <a:prstGeom prst="line">
+            <a:avLst/>
+          </a:prstGeom>
+          <a:ln w="19050" cap="flat" cmpd="sng" algn="ctr">
+            <a:solidFill>
+              <a:srgbClr val="FFFF00"/>
+            </a:solidFill>
+            <a:prstDash val="sysDot"/>
+            <a:round/>
+            <a:headEnd type="none" w="med" len="med"/>
+            <a:tailEnd type="none" w="med" len="med"/>
+          </a:ln>
+        </p:spPr>
+        <p:style>
+          <a:lnRef idx="0">
+            <a:scrgbClr r="0" g="0" b="0"/>
+          </a:lnRef>
+          <a:fillRef idx="0">
+            <a:scrgbClr r="0" g="0" b="0"/>
+          </a:fillRef>
+          <a:effectRef idx="0">
+            <a:scrgbClr r="0" g="0" b="0"/>
+          </a:effectRef>
+          <a:fontRef idx="minor">
+            <a:schemeClr val="tx1"/>
+          </a:fontRef>
+        </p:style>
+      </p:cxnSp>
+      <p:cxnSp>
+        <p:nvCxnSpPr>
+          <p:cNvPr id="34" name="Straight Connector 33">
+            <a:extLst>
+              <a:ext uri="{FF2B5EF4-FFF2-40B4-BE49-F238E27FC236}">
+                <a16:creationId xmlns:a16="http://schemas.microsoft.com/office/drawing/2014/main" id="{BA160399-62A2-4A70-ACA3-0B31A2310BCB}"/>
+              </a:ext>
+            </a:extLst>
+          </p:cNvPr>
+          <p:cNvCxnSpPr>
+            <a:cxnSpLocks/>
+          </p:cNvCxnSpPr>
+          <p:nvPr/>
+        </p:nvCxnSpPr>
+        <p:spPr>
+          <a:xfrm flipV="1">
+            <a:off x="4970882" y="3732245"/>
+            <a:ext cx="0" cy="711459"/>
+          </a:xfrm>
+          <a:prstGeom prst="line">
+            <a:avLst/>
+          </a:prstGeom>
+          <a:ln w="19050" cap="flat" cmpd="sng" algn="ctr">
+            <a:solidFill>
+              <a:srgbClr val="FFFF00"/>
+            </a:solidFill>
+            <a:prstDash val="sysDot"/>
+            <a:round/>
+            <a:headEnd type="none" w="med" len="med"/>
+            <a:tailEnd type="none" w="med" len="med"/>
+          </a:ln>
+        </p:spPr>
+        <p:style>
+          <a:lnRef idx="0">
+            <a:scrgbClr r="0" g="0" b="0"/>
+          </a:lnRef>
+          <a:fillRef idx="0">
+            <a:scrgbClr r="0" g="0" b="0"/>
+          </a:fillRef>
+          <a:effectRef idx="0">
+            <a:scrgbClr r="0" g="0" b="0"/>
+          </a:effectRef>
+          <a:fontRef idx="minor">
+            <a:schemeClr val="tx1"/>
+          </a:fontRef>
+        </p:style>
+      </p:cxnSp>
+      <p:cxnSp>
+        <p:nvCxnSpPr>
+          <p:cNvPr id="35" name="Straight Connector 34">
+            <a:extLst>
+              <a:ext uri="{FF2B5EF4-FFF2-40B4-BE49-F238E27FC236}">
+                <a16:creationId xmlns:a16="http://schemas.microsoft.com/office/drawing/2014/main" id="{28633A1F-35BB-4201-B1D2-D50B4B2CB2B2}"/>
+              </a:ext>
+            </a:extLst>
+          </p:cNvPr>
+          <p:cNvCxnSpPr>
+            <a:cxnSpLocks/>
+          </p:cNvCxnSpPr>
+          <p:nvPr/>
+        </p:nvCxnSpPr>
+        <p:spPr>
+          <a:xfrm flipV="1">
+            <a:off x="7473824" y="3714750"/>
+            <a:ext cx="0" cy="711459"/>
+          </a:xfrm>
+          <a:prstGeom prst="line">
+            <a:avLst/>
+          </a:prstGeom>
+          <a:ln w="19050" cap="flat" cmpd="sng" algn="ctr">
+            <a:solidFill>
+              <a:srgbClr val="FFFF00"/>
+            </a:solidFill>
+            <a:prstDash val="sysDot"/>
+            <a:round/>
+            <a:headEnd type="none" w="med" len="med"/>
+            <a:tailEnd type="none" w="med" len="med"/>
+          </a:ln>
+        </p:spPr>
+        <p:style>
+          <a:lnRef idx="0">
+            <a:scrgbClr r="0" g="0" b="0"/>
+          </a:lnRef>
+          <a:fillRef idx="0">
+            <a:scrgbClr r="0" g="0" b="0"/>
+          </a:fillRef>
+          <a:effectRef idx="0">
+            <a:scrgbClr r="0" g="0" b="0"/>
+          </a:effectRef>
+          <a:fontRef idx="minor">
+            <a:schemeClr val="tx1"/>
+          </a:fontRef>
+        </p:style>
+      </p:cxnSp>
+      <p:cxnSp>
+        <p:nvCxnSpPr>
+          <p:cNvPr id="36" name="Straight Connector 35">
+            <a:extLst>
+              <a:ext uri="{FF2B5EF4-FFF2-40B4-BE49-F238E27FC236}">
+                <a16:creationId xmlns:a16="http://schemas.microsoft.com/office/drawing/2014/main" id="{98930705-62C9-45EF-A069-5D72A0835AFF}"/>
+              </a:ext>
+            </a:extLst>
+          </p:cNvPr>
+          <p:cNvCxnSpPr>
+            <a:cxnSpLocks/>
+          </p:cNvCxnSpPr>
+          <p:nvPr/>
+        </p:nvCxnSpPr>
+        <p:spPr>
+          <a:xfrm flipV="1">
+            <a:off x="1114425" y="3003291"/>
+            <a:ext cx="0" cy="711459"/>
+          </a:xfrm>
+          <a:prstGeom prst="line">
+            <a:avLst/>
+          </a:prstGeom>
+          <a:ln w="19050" cap="flat" cmpd="sng" algn="ctr">
+            <a:solidFill>
+              <a:srgbClr val="FFFF00"/>
+            </a:solidFill>
+            <a:prstDash val="sysDot"/>
+            <a:round/>
+            <a:headEnd type="none" w="med" len="med"/>
+            <a:tailEnd type="none" w="med" len="med"/>
+          </a:ln>
+        </p:spPr>
+        <p:style>
+          <a:lnRef idx="0">
+            <a:scrgbClr r="0" g="0" b="0"/>
+          </a:lnRef>
+          <a:fillRef idx="0">
+            <a:scrgbClr r="0" g="0" b="0"/>
+          </a:fillRef>
+          <a:effectRef idx="0">
+            <a:scrgbClr r="0" g="0" b="0"/>
+          </a:effectRef>
+          <a:fontRef idx="minor">
+            <a:schemeClr val="tx1"/>
+          </a:fontRef>
+        </p:style>
+      </p:cxnSp>
+      <p:cxnSp>
+        <p:nvCxnSpPr>
+          <p:cNvPr id="37" name="Straight Connector 36">
+            <a:extLst>
+              <a:ext uri="{FF2B5EF4-FFF2-40B4-BE49-F238E27FC236}">
+                <a16:creationId xmlns:a16="http://schemas.microsoft.com/office/drawing/2014/main" id="{03B4EB12-ACE5-484F-9537-0A78E28F86C7}"/>
+              </a:ext>
+            </a:extLst>
+          </p:cNvPr>
+          <p:cNvCxnSpPr>
+            <a:cxnSpLocks/>
+          </p:cNvCxnSpPr>
+          <p:nvPr/>
+        </p:nvCxnSpPr>
+        <p:spPr>
+          <a:xfrm flipV="1">
+            <a:off x="3558180" y="3001833"/>
+            <a:ext cx="0" cy="711459"/>
+          </a:xfrm>
+          <a:prstGeom prst="line">
+            <a:avLst/>
+          </a:prstGeom>
+          <a:ln w="19050" cap="flat" cmpd="sng" algn="ctr">
+            <a:solidFill>
+              <a:srgbClr val="FFFF00"/>
+            </a:solidFill>
+            <a:prstDash val="sysDot"/>
+            <a:round/>
+            <a:headEnd type="none" w="med" len="med"/>
+            <a:tailEnd type="none" w="med" len="med"/>
+          </a:ln>
+        </p:spPr>
+        <p:style>
+          <a:lnRef idx="0">
+            <a:scrgbClr r="0" g="0" b="0"/>
+          </a:lnRef>
+          <a:fillRef idx="0">
+            <a:scrgbClr r="0" g="0" b="0"/>
+          </a:fillRef>
+          <a:effectRef idx="0">
+            <a:scrgbClr r="0" g="0" b="0"/>
+          </a:effectRef>
+          <a:fontRef idx="minor">
+            <a:schemeClr val="tx1"/>
+          </a:fontRef>
+        </p:style>
+      </p:cxnSp>
+      <p:cxnSp>
+        <p:nvCxnSpPr>
+          <p:cNvPr id="38" name="Straight Connector 37">
+            <a:extLst>
+              <a:ext uri="{FF2B5EF4-FFF2-40B4-BE49-F238E27FC236}">
+                <a16:creationId xmlns:a16="http://schemas.microsoft.com/office/drawing/2014/main" id="{48E2F7DB-653E-41DE-94CF-28276678A67A}"/>
+              </a:ext>
+            </a:extLst>
+          </p:cNvPr>
+          <p:cNvCxnSpPr>
+            <a:cxnSpLocks/>
+          </p:cNvCxnSpPr>
+          <p:nvPr/>
+        </p:nvCxnSpPr>
+        <p:spPr>
+          <a:xfrm flipV="1">
+            <a:off x="5138847" y="3020786"/>
+            <a:ext cx="0" cy="711459"/>
+          </a:xfrm>
+          <a:prstGeom prst="line">
+            <a:avLst/>
+          </a:prstGeom>
+          <a:ln w="19050" cap="flat" cmpd="sng" algn="ctr">
+            <a:solidFill>
+              <a:srgbClr val="FFFF00"/>
+            </a:solidFill>
+            <a:prstDash val="sysDot"/>
+            <a:round/>
+            <a:headEnd type="none" w="med" len="med"/>
+            <a:tailEnd type="none" w="med" len="med"/>
+          </a:ln>
+        </p:spPr>
+        <p:style>
+          <a:lnRef idx="0">
+            <a:scrgbClr r="0" g="0" b="0"/>
+          </a:lnRef>
+          <a:fillRef idx="0">
+            <a:scrgbClr r="0" g="0" b="0"/>
+          </a:fillRef>
+          <a:effectRef idx="0">
+            <a:scrgbClr r="0" g="0" b="0"/>
+          </a:effectRef>
+          <a:fontRef idx="minor">
+            <a:schemeClr val="tx1"/>
+          </a:fontRef>
+        </p:style>
+      </p:cxnSp>
+      <p:cxnSp>
+        <p:nvCxnSpPr>
+          <p:cNvPr id="39" name="Straight Connector 38">
+            <a:extLst>
+              <a:ext uri="{FF2B5EF4-FFF2-40B4-BE49-F238E27FC236}">
+                <a16:creationId xmlns:a16="http://schemas.microsoft.com/office/drawing/2014/main" id="{54410F87-914E-4D44-B2DD-CDD4212B0F68}"/>
+              </a:ext>
+            </a:extLst>
+          </p:cNvPr>
+          <p:cNvCxnSpPr>
+            <a:cxnSpLocks/>
+          </p:cNvCxnSpPr>
+          <p:nvPr/>
+        </p:nvCxnSpPr>
+        <p:spPr>
+          <a:xfrm flipV="1">
+            <a:off x="6669641" y="3020786"/>
+            <a:ext cx="0" cy="711459"/>
+          </a:xfrm>
+          <a:prstGeom prst="line">
+            <a:avLst/>
+          </a:prstGeom>
+          <a:ln w="19050" cap="flat" cmpd="sng" algn="ctr">
+            <a:solidFill>
+              <a:srgbClr val="FFFF00"/>
+            </a:solidFill>
+            <a:prstDash val="sysDot"/>
+            <a:round/>
+            <a:headEnd type="none" w="med" len="med"/>
+            <a:tailEnd type="none" w="med" len="med"/>
+          </a:ln>
+        </p:spPr>
+        <p:style>
+          <a:lnRef idx="0">
+            <a:scrgbClr r="0" g="0" b="0"/>
+          </a:lnRef>
+          <a:fillRef idx="0">
+            <a:scrgbClr r="0" g="0" b="0"/>
+          </a:fillRef>
+          <a:effectRef idx="0">
+            <a:scrgbClr r="0" g="0" b="0"/>
+          </a:effectRef>
+          <a:fontRef idx="minor">
+            <a:schemeClr val="tx1"/>
+          </a:fontRef>
+        </p:style>
+      </p:cxnSp>
+      <p:cxnSp>
+        <p:nvCxnSpPr>
+          <p:cNvPr id="40" name="Straight Connector 39">
+            <a:extLst>
+              <a:ext uri="{FF2B5EF4-FFF2-40B4-BE49-F238E27FC236}">
+                <a16:creationId xmlns:a16="http://schemas.microsoft.com/office/drawing/2014/main" id="{88B40BCA-240F-4D90-B238-6DB76E67672C}"/>
+              </a:ext>
+            </a:extLst>
+          </p:cNvPr>
+          <p:cNvCxnSpPr>
+            <a:cxnSpLocks/>
+          </p:cNvCxnSpPr>
+          <p:nvPr/>
+        </p:nvCxnSpPr>
+        <p:spPr>
+          <a:xfrm flipV="1">
+            <a:off x="8288503" y="3001833"/>
+            <a:ext cx="0" cy="711459"/>
+          </a:xfrm>
+          <a:prstGeom prst="line">
+            <a:avLst/>
+          </a:prstGeom>
+          <a:ln w="19050" cap="flat" cmpd="sng" algn="ctr">
+            <a:solidFill>
+              <a:srgbClr val="FFFF00"/>
+            </a:solidFill>
+            <a:prstDash val="sysDot"/>
+            <a:round/>
+            <a:headEnd type="none" w="med" len="med"/>
+            <a:tailEnd type="none" w="med" len="med"/>
+          </a:ln>
+        </p:spPr>
+        <p:style>
+          <a:lnRef idx="0">
+            <a:scrgbClr r="0" g="0" b="0"/>
+          </a:lnRef>
+          <a:fillRef idx="0">
+            <a:scrgbClr r="0" g="0" b="0"/>
+          </a:fillRef>
+          <a:effectRef idx="0">
+            <a:scrgbClr r="0" g="0" b="0"/>
+          </a:effectRef>
+          <a:fontRef idx="minor">
+            <a:schemeClr val="tx1"/>
+          </a:fontRef>
+        </p:style>
+      </p:cxnSp>
+      <p:sp>
+        <p:nvSpPr>
+          <p:cNvPr id="46" name="Callout: Down Arrow 45">
+            <a:extLst>
+              <a:ext uri="{FF2B5EF4-FFF2-40B4-BE49-F238E27FC236}">
+                <a16:creationId xmlns:a16="http://schemas.microsoft.com/office/drawing/2014/main" id="{49EBF5C6-E60A-42A8-B958-840D851E7923}"/>
+              </a:ext>
+            </a:extLst>
+          </p:cNvPr>
+          <p:cNvSpPr/>
+          <p:nvPr/>
+        </p:nvSpPr>
+        <p:spPr>
+          <a:xfrm>
+            <a:off x="749449" y="1131485"/>
+            <a:ext cx="1014044" cy="738869"/>
+          </a:xfrm>
+          <a:prstGeom prst="downArrowCallout">
+            <a:avLst>
+              <a:gd name="adj1" fmla="val 25000"/>
+              <a:gd name="adj2" fmla="val 24072"/>
+              <a:gd name="adj3" fmla="val 25000"/>
+              <a:gd name="adj4" fmla="val 64977"/>
+            </a:avLst>
+          </a:prstGeom>
+          <a:solidFill>
+            <a:schemeClr val="accent2">
+              <a:lumMod val="60000"/>
+              <a:lumOff val="40000"/>
+            </a:schemeClr>
+          </a:solidFill>
+          <a:ln>
+            <a:solidFill>
+              <a:srgbClr val="C00000"/>
+            </a:solidFill>
+          </a:ln>
+        </p:spPr>
+        <p:style>
+          <a:lnRef idx="2">
+            <a:schemeClr val="accent1">
+              <a:shade val="50000"/>
+            </a:schemeClr>
+          </a:lnRef>
+          <a:fillRef idx="1">
+            <a:schemeClr val="accent1"/>
+          </a:fillRef>
+          <a:effectRef idx="0">
+            <a:schemeClr val="accent1"/>
+          </a:effectRef>
+          <a:fontRef idx="minor">
+            <a:schemeClr val="lt1"/>
+          </a:fontRef>
+        </p:style>
+        <p:txBody>
+          <a:bodyPr rtlCol="0" anchor="ctr"/>
+          <a:lstStyle/>
+          <a:p>
+            <a:pPr algn="ctr"/>
+            <a:r>
+              <a:rPr lang="en-US" sz="1350" dirty="0"/>
+              <a:t>Data Feeds</a:t>
+            </a:r>
+          </a:p>
+        </p:txBody>
+      </p:sp>
+      <p:sp>
+        <p:nvSpPr>
+          <p:cNvPr id="47" name="Callout: Down Arrow 46">
+            <a:extLst>
+              <a:ext uri="{FF2B5EF4-FFF2-40B4-BE49-F238E27FC236}">
+                <a16:creationId xmlns:a16="http://schemas.microsoft.com/office/drawing/2014/main" id="{CD2015A2-8F90-4E71-9AE2-0D4168233F9B}"/>
+              </a:ext>
+            </a:extLst>
+          </p:cNvPr>
+          <p:cNvSpPr/>
+          <p:nvPr/>
+        </p:nvSpPr>
+        <p:spPr>
+          <a:xfrm>
+            <a:off x="5359446" y="1115008"/>
+            <a:ext cx="1390260" cy="738869"/>
+          </a:xfrm>
+          <a:prstGeom prst="downArrowCallout">
+            <a:avLst>
+              <a:gd name="adj1" fmla="val 25000"/>
+              <a:gd name="adj2" fmla="val 24072"/>
+              <a:gd name="adj3" fmla="val 25000"/>
+              <a:gd name="adj4" fmla="val 64977"/>
+            </a:avLst>
+          </a:prstGeom>
+          <a:solidFill>
+            <a:schemeClr val="accent2">
+              <a:lumMod val="60000"/>
+              <a:lumOff val="40000"/>
+            </a:schemeClr>
+          </a:solidFill>
+          <a:ln>
+            <a:solidFill>
+              <a:srgbClr val="C00000"/>
+            </a:solidFill>
+          </a:ln>
+        </p:spPr>
+        <p:style>
+          <a:lnRef idx="2">
+            <a:schemeClr val="accent1">
+              <a:shade val="50000"/>
+            </a:schemeClr>
+          </a:lnRef>
+          <a:fillRef idx="1">
+            <a:schemeClr val="accent1"/>
+          </a:fillRef>
+          <a:effectRef idx="0">
+            <a:schemeClr val="accent1"/>
+          </a:effectRef>
+          <a:fontRef idx="minor">
+            <a:schemeClr val="lt1"/>
+          </a:fontRef>
+        </p:style>
+        <p:txBody>
+          <a:bodyPr rtlCol="0" anchor="ctr"/>
+          <a:lstStyle/>
+          <a:p>
+            <a:pPr algn="ctr"/>
+            <a:r>
+              <a:rPr lang="en-US" sz="1350" dirty="0"/>
+              <a:t>External Feeds</a:t>
+            </a:r>
+          </a:p>
+        </p:txBody>
+      </p:sp>
+    </p:spTree>
+    <p:extLst>
+      <p:ext uri="{BB962C8B-B14F-4D97-AF65-F5344CB8AC3E}">
+        <p14:creationId xmlns:p14="http://schemas.microsoft.com/office/powerpoint/2010/main" val="1304960065"/>
+      </p:ext>
+    </p:extLst>
+  </p:cSld>
+  <p:clrMapOvr>
+    <a:masterClrMapping/>
+  </p:clrMapOvr>
+</p:sld>
+</file>
+
+<file path=ppt/slides/slide4.xml><?xml version="1.0" encoding="utf-8"?>
+<p:sld xmlns:a="http://schemas.openxmlformats.org/drawingml/2006/main" xmlns:r="http://schemas.openxmlformats.org/officeDocument/2006/relationships" xmlns:p="http://schemas.openxmlformats.org/presentationml/2006/main">
+  <p:cSld>
+    <p:spTree>
+      <p:nvGrpSpPr>
+        <p:cNvPr id="1" name=""/>
+        <p:cNvGrpSpPr/>
+        <p:nvPr/>
+      </p:nvGrpSpPr>
+      <p:grpSpPr>
+        <a:xfrm>
+          <a:off x="0" y="0"/>
+          <a:ext cx="0" cy="0"/>
+          <a:chOff x="0" y="0"/>
+          <a:chExt cx="0" cy="0"/>
+        </a:xfrm>
+      </p:grpSpPr>
+      <p:sp>
+        <p:nvSpPr>
+          <p:cNvPr id="18" name="Rectangle 17">
+            <a:extLst>
+              <a:ext uri="{FF2B5EF4-FFF2-40B4-BE49-F238E27FC236}">
+                <a16:creationId xmlns:a16="http://schemas.microsoft.com/office/drawing/2014/main" id="{3A191B8C-64FA-4FAE-8A60-C466E5EF1E6B}"/>
+              </a:ext>
+            </a:extLst>
+          </p:cNvPr>
+          <p:cNvSpPr/>
+          <p:nvPr/>
+        </p:nvSpPr>
+        <p:spPr>
+          <a:xfrm>
+            <a:off x="2857500" y="1085850"/>
+            <a:ext cx="2686050" cy="4629150"/>
+          </a:xfrm>
+          <a:prstGeom prst="rect">
+            <a:avLst/>
+          </a:prstGeom>
+          <a:noFill/>
+          <a:ln w="38100">
+            <a:solidFill>
+              <a:schemeClr val="bg2">
+                <a:lumMod val="10000"/>
+              </a:schemeClr>
+            </a:solidFill>
+          </a:ln>
+        </p:spPr>
+        <p:style>
+          <a:lnRef idx="2">
+            <a:schemeClr val="accent1">
+              <a:shade val="50000"/>
+            </a:schemeClr>
+          </a:lnRef>
+          <a:fillRef idx="1">
+            <a:schemeClr val="accent1"/>
+          </a:fillRef>
+          <a:effectRef idx="0">
+            <a:schemeClr val="accent1"/>
+          </a:effectRef>
+          <a:fontRef idx="minor">
+            <a:schemeClr val="lt1"/>
+          </a:fontRef>
+        </p:style>
+        <p:txBody>
+          <a:bodyPr rtlCol="0" anchor="ctr"/>
+          <a:lstStyle/>
+          <a:p>
+            <a:pPr algn="ctr"/>
+            <a:endParaRPr lang="en-US" sz="1350"/>
+          </a:p>
+        </p:txBody>
+      </p:sp>
+      <p:sp>
+        <p:nvSpPr>
+          <p:cNvPr id="5" name="Cube 4">
+            <a:extLst>
+              <a:ext uri="{FF2B5EF4-FFF2-40B4-BE49-F238E27FC236}">
+                <a16:creationId xmlns:a16="http://schemas.microsoft.com/office/drawing/2014/main" id="{CC26439A-865C-4CCD-92A2-EA97A6D54413}"/>
+              </a:ext>
+            </a:extLst>
+          </p:cNvPr>
+          <p:cNvSpPr/>
+          <p:nvPr/>
+        </p:nvSpPr>
+        <p:spPr>
+          <a:xfrm>
+            <a:off x="3028950" y="2255675"/>
+            <a:ext cx="2343150" cy="571500"/>
+          </a:xfrm>
+          <a:prstGeom prst="cube">
+            <a:avLst/>
+          </a:prstGeom>
+        </p:spPr>
+        <p:style>
+          <a:lnRef idx="2">
+            <a:schemeClr val="accent1">
+              <a:shade val="50000"/>
+            </a:schemeClr>
+          </a:lnRef>
+          <a:fillRef idx="1">
+            <a:schemeClr val="accent1"/>
+          </a:fillRef>
+          <a:effectRef idx="0">
+            <a:schemeClr val="accent1"/>
+          </a:effectRef>
+          <a:fontRef idx="minor">
+            <a:schemeClr val="lt1"/>
+          </a:fontRef>
+        </p:style>
+        <p:txBody>
+          <a:bodyPr rtlCol="0" anchor="ctr"/>
+          <a:lstStyle/>
+          <a:p>
+            <a:pPr algn="ctr"/>
+            <a:r>
+              <a:rPr lang="en-US" sz="1350"/>
+              <a:t>Real-Time </a:t>
+            </a:r>
+            <a:r>
+              <a:rPr lang="en-US" sz="1350" dirty="0"/>
+              <a:t>Distribution System</a:t>
+            </a:r>
+          </a:p>
+        </p:txBody>
+      </p:sp>
+      <p:sp>
+        <p:nvSpPr>
+          <p:cNvPr id="6" name="Cube 5">
+            <a:extLst>
+              <a:ext uri="{FF2B5EF4-FFF2-40B4-BE49-F238E27FC236}">
+                <a16:creationId xmlns:a16="http://schemas.microsoft.com/office/drawing/2014/main" id="{3F757FFB-1526-4274-AF22-D159589FEEB4}"/>
+              </a:ext>
+            </a:extLst>
+          </p:cNvPr>
+          <p:cNvSpPr/>
+          <p:nvPr/>
+        </p:nvSpPr>
+        <p:spPr>
+          <a:xfrm>
+            <a:off x="2971800" y="3272712"/>
+            <a:ext cx="2343150" cy="571500"/>
+          </a:xfrm>
+          <a:prstGeom prst="cube">
+            <a:avLst/>
+          </a:prstGeom>
+          <a:solidFill>
+            <a:schemeClr val="accent6">
+              <a:lumMod val="75000"/>
+            </a:schemeClr>
+          </a:solidFill>
+          <a:ln>
+            <a:solidFill>
+              <a:schemeClr val="accent6">
+                <a:lumMod val="50000"/>
+              </a:schemeClr>
+            </a:solidFill>
+          </a:ln>
+        </p:spPr>
+        <p:style>
+          <a:lnRef idx="2">
+            <a:schemeClr val="accent1">
+              <a:shade val="50000"/>
+            </a:schemeClr>
+          </a:lnRef>
+          <a:fillRef idx="1">
+            <a:schemeClr val="accent1"/>
+          </a:fillRef>
+          <a:effectRef idx="0">
+            <a:schemeClr val="accent1"/>
+          </a:effectRef>
+          <a:fontRef idx="minor">
+            <a:schemeClr val="lt1"/>
+          </a:fontRef>
+        </p:style>
+        <p:txBody>
+          <a:bodyPr rot="0" spcFirstLastPara="0" vertOverflow="overflow" horzOverflow="overflow" vert="horz" wrap="square" lIns="68580" tIns="34290" rIns="68580" bIns="34290" numCol="1" spcCol="0" rtlCol="0" fromWordArt="0" anchor="ctr" anchorCtr="0" forceAA="0" compatLnSpc="1">
+            <a:prstTxWarp prst="textNoShape">
+              <a:avLst/>
+            </a:prstTxWarp>
+            <a:noAutofit/>
+          </a:bodyPr>
+          <a:lstStyle/>
+          <a:p>
+            <a:pPr algn="ctr"/>
+            <a:r>
+              <a:rPr lang="en-US" sz="1350" dirty="0"/>
+              <a:t>Advanced Distribution Server</a:t>
+            </a:r>
+          </a:p>
+        </p:txBody>
+      </p:sp>
+      <p:sp>
+        <p:nvSpPr>
+          <p:cNvPr id="7" name="Cube 6">
+            <a:extLst>
+              <a:ext uri="{FF2B5EF4-FFF2-40B4-BE49-F238E27FC236}">
+                <a16:creationId xmlns:a16="http://schemas.microsoft.com/office/drawing/2014/main" id="{D9DF8296-7AA2-4566-9EBA-B81C7470D288}"/>
+              </a:ext>
+            </a:extLst>
+          </p:cNvPr>
+          <p:cNvSpPr/>
+          <p:nvPr/>
+        </p:nvSpPr>
+        <p:spPr>
+          <a:xfrm>
+            <a:off x="2971800" y="5032699"/>
+            <a:ext cx="2343150" cy="571500"/>
+          </a:xfrm>
+          <a:prstGeom prst="cube">
+            <a:avLst/>
+          </a:prstGeom>
+          <a:solidFill>
+            <a:schemeClr val="accent3">
+              <a:lumMod val="75000"/>
+            </a:schemeClr>
+          </a:solidFill>
+          <a:ln>
+            <a:solidFill>
+              <a:schemeClr val="accent3">
+                <a:lumMod val="60000"/>
+                <a:lumOff val="40000"/>
+              </a:schemeClr>
+            </a:solidFill>
+          </a:ln>
+        </p:spPr>
+        <p:style>
+          <a:lnRef idx="2">
+            <a:schemeClr val="accent1">
+              <a:shade val="50000"/>
+            </a:schemeClr>
+          </a:lnRef>
+          <a:fillRef idx="1">
+            <a:schemeClr val="accent1"/>
+          </a:fillRef>
+          <a:effectRef idx="0">
+            <a:schemeClr val="accent1"/>
+          </a:effectRef>
+          <a:fontRef idx="minor">
+            <a:schemeClr val="lt1"/>
+          </a:fontRef>
+        </p:style>
+        <p:txBody>
+          <a:bodyPr rtlCol="0" anchor="ctr"/>
+          <a:lstStyle/>
+          <a:p>
+            <a:pPr algn="ctr"/>
+            <a:r>
+              <a:rPr lang="en-US" sz="1350" dirty="0"/>
+              <a:t>Consumer</a:t>
+            </a:r>
+          </a:p>
+        </p:txBody>
+      </p:sp>
+      <p:sp>
+        <p:nvSpPr>
+          <p:cNvPr id="8" name="Cube 7">
+            <a:extLst>
+              <a:ext uri="{FF2B5EF4-FFF2-40B4-BE49-F238E27FC236}">
+                <a16:creationId xmlns:a16="http://schemas.microsoft.com/office/drawing/2014/main" id="{27225E78-1975-4955-AFD5-400CF23E0AC7}"/>
+              </a:ext>
+            </a:extLst>
+          </p:cNvPr>
+          <p:cNvSpPr/>
+          <p:nvPr/>
+        </p:nvSpPr>
+        <p:spPr>
+          <a:xfrm>
+            <a:off x="3028950" y="1200150"/>
+            <a:ext cx="2343150" cy="571500"/>
+          </a:xfrm>
+          <a:prstGeom prst="cube">
+            <a:avLst/>
+          </a:prstGeom>
+          <a:solidFill>
+            <a:schemeClr val="accent6">
+              <a:lumMod val="75000"/>
+            </a:schemeClr>
+          </a:solidFill>
+          <a:ln>
+            <a:solidFill>
+              <a:schemeClr val="accent6">
+                <a:lumMod val="50000"/>
+              </a:schemeClr>
+            </a:solidFill>
+          </a:ln>
+        </p:spPr>
+        <p:style>
+          <a:lnRef idx="2">
+            <a:schemeClr val="accent1">
+              <a:shade val="50000"/>
+            </a:schemeClr>
+          </a:lnRef>
+          <a:fillRef idx="1">
+            <a:schemeClr val="accent1"/>
+          </a:fillRef>
+          <a:effectRef idx="0">
+            <a:schemeClr val="accent1"/>
+          </a:effectRef>
+          <a:fontRef idx="minor">
+            <a:schemeClr val="lt1"/>
+          </a:fontRef>
+        </p:style>
+        <p:txBody>
+          <a:bodyPr rtlCol="0" anchor="ctr"/>
+          <a:lstStyle/>
+          <a:p>
+            <a:pPr algn="ctr"/>
+            <a:r>
+              <a:rPr lang="en-US" sz="1350" dirty="0"/>
+              <a:t>ATS Server</a:t>
+            </a:r>
+          </a:p>
+        </p:txBody>
+      </p:sp>
+      <p:sp>
+        <p:nvSpPr>
+          <p:cNvPr id="9" name="Rectangle 8">
+            <a:extLst>
+              <a:ext uri="{FF2B5EF4-FFF2-40B4-BE49-F238E27FC236}">
+                <a16:creationId xmlns:a16="http://schemas.microsoft.com/office/drawing/2014/main" id="{B119EB45-4B8A-4967-B60E-1DBD0CD6C041}"/>
+              </a:ext>
+            </a:extLst>
+          </p:cNvPr>
+          <p:cNvSpPr/>
+          <p:nvPr/>
+        </p:nvSpPr>
+        <p:spPr>
+          <a:xfrm>
+            <a:off x="3692590" y="3886200"/>
+            <a:ext cx="857250" cy="1146499"/>
+          </a:xfrm>
+          <a:prstGeom prst="rect">
+            <a:avLst/>
+          </a:prstGeom>
+          <a:solidFill>
+            <a:schemeClr val="accent3">
+              <a:lumMod val="60000"/>
+              <a:lumOff val="40000"/>
+            </a:schemeClr>
+          </a:solidFill>
+          <a:ln>
+            <a:noFill/>
+          </a:ln>
+        </p:spPr>
+        <p:style>
+          <a:lnRef idx="2">
+            <a:schemeClr val="accent1">
+              <a:shade val="50000"/>
+            </a:schemeClr>
+          </a:lnRef>
+          <a:fillRef idx="1">
+            <a:schemeClr val="accent1"/>
+          </a:fillRef>
+          <a:effectRef idx="0">
+            <a:schemeClr val="accent1"/>
+          </a:effectRef>
+          <a:fontRef idx="minor">
+            <a:schemeClr val="lt1"/>
+          </a:fontRef>
+        </p:style>
+        <p:txBody>
+          <a:bodyPr rtlCol="0" anchor="ctr"/>
+          <a:lstStyle/>
+          <a:p>
+            <a:pPr algn="ctr"/>
+            <a:endParaRPr lang="en-US" sz="1350"/>
+          </a:p>
+        </p:txBody>
+      </p:sp>
+      <p:sp>
+        <p:nvSpPr>
+          <p:cNvPr id="10" name="TextBox 9">
+            <a:extLst>
+              <a:ext uri="{FF2B5EF4-FFF2-40B4-BE49-F238E27FC236}">
+                <a16:creationId xmlns:a16="http://schemas.microsoft.com/office/drawing/2014/main" id="{6D80B0D7-6709-4D38-A5CF-7F3C3752DCC4}"/>
+              </a:ext>
+            </a:extLst>
+          </p:cNvPr>
+          <p:cNvSpPr txBox="1"/>
+          <p:nvPr/>
+        </p:nvSpPr>
+        <p:spPr>
+          <a:xfrm rot="16200000">
+            <a:off x="3913465" y="4286082"/>
+            <a:ext cx="995750" cy="300082"/>
+          </a:xfrm>
+          <a:prstGeom prst="rect">
+            <a:avLst/>
+          </a:prstGeom>
+          <a:noFill/>
+        </p:spPr>
+        <p:txBody>
+          <a:bodyPr wrap="square" rtlCol="0">
+            <a:spAutoFit/>
+          </a:bodyPr>
+          <a:lstStyle/>
+          <a:p>
+            <a:r>
+              <a:rPr lang="en-US" sz="1350" dirty="0"/>
+              <a:t>OMM Post</a:t>
+            </a:r>
+          </a:p>
+        </p:txBody>
+      </p:sp>
+      <p:cxnSp>
+        <p:nvCxnSpPr>
+          <p:cNvPr id="12" name="Straight Arrow Connector 11">
+            <a:extLst>
+              <a:ext uri="{FF2B5EF4-FFF2-40B4-BE49-F238E27FC236}">
+                <a16:creationId xmlns:a16="http://schemas.microsoft.com/office/drawing/2014/main" id="{A955242F-A066-4A58-8162-1084DF62437D}"/>
+              </a:ext>
+            </a:extLst>
+          </p:cNvPr>
+          <p:cNvCxnSpPr>
+            <a:cxnSpLocks/>
+            <a:stCxn id="9" idx="2"/>
+            <a:endCxn id="9" idx="0"/>
+          </p:cNvCxnSpPr>
+          <p:nvPr/>
+        </p:nvCxnSpPr>
+        <p:spPr>
+          <a:xfrm flipV="1">
+            <a:off x="4121215" y="3886200"/>
+            <a:ext cx="0" cy="1146499"/>
+          </a:xfrm>
+          <a:prstGeom prst="straightConnector1">
+            <a:avLst/>
+          </a:prstGeom>
+          <a:ln w="19050" cap="flat" cmpd="sng" algn="ctr">
+            <a:solidFill>
+              <a:schemeClr val="dk1"/>
+            </a:solidFill>
+            <a:prstDash val="solid"/>
+            <a:round/>
+            <a:headEnd type="none" w="med" len="med"/>
+            <a:tailEnd type="triangle" w="lg" len="med"/>
+          </a:ln>
+        </p:spPr>
+        <p:style>
+          <a:lnRef idx="0">
+            <a:scrgbClr r="0" g="0" b="0"/>
+          </a:lnRef>
+          <a:fillRef idx="0">
+            <a:scrgbClr r="0" g="0" b="0"/>
+          </a:fillRef>
+          <a:effectRef idx="0">
+            <a:scrgbClr r="0" g="0" b="0"/>
+          </a:effectRef>
+          <a:fontRef idx="minor">
+            <a:schemeClr val="tx1"/>
+          </a:fontRef>
+        </p:style>
+      </p:cxnSp>
+      <p:cxnSp>
+        <p:nvCxnSpPr>
+          <p:cNvPr id="14" name="Straight Arrow Connector 13">
+            <a:extLst>
+              <a:ext uri="{FF2B5EF4-FFF2-40B4-BE49-F238E27FC236}">
+                <a16:creationId xmlns:a16="http://schemas.microsoft.com/office/drawing/2014/main" id="{48A09E12-956F-4675-8F7B-A3ACDD1CB350}"/>
+              </a:ext>
+            </a:extLst>
+          </p:cNvPr>
+          <p:cNvCxnSpPr>
+            <a:cxnSpLocks/>
+          </p:cNvCxnSpPr>
+          <p:nvPr/>
+        </p:nvCxnSpPr>
+        <p:spPr>
+          <a:xfrm flipV="1">
+            <a:off x="4121215" y="2827176"/>
+            <a:ext cx="0" cy="445536"/>
+          </a:xfrm>
+          <a:prstGeom prst="straightConnector1">
+            <a:avLst/>
+          </a:prstGeom>
+          <a:ln w="19050" cap="flat" cmpd="sng" algn="ctr">
+            <a:solidFill>
+              <a:schemeClr val="dk1"/>
+            </a:solidFill>
+            <a:prstDash val="solid"/>
+            <a:round/>
+            <a:headEnd type="triangle" w="lg" len="med"/>
+            <a:tailEnd type="triangle" w="lg" len="med"/>
+          </a:ln>
+        </p:spPr>
+        <p:style>
+          <a:lnRef idx="0">
+            <a:scrgbClr r="0" g="0" b="0"/>
+          </a:lnRef>
+          <a:fillRef idx="0">
+            <a:scrgbClr r="0" g="0" b="0"/>
+          </a:fillRef>
+          <a:effectRef idx="0">
+            <a:scrgbClr r="0" g="0" b="0"/>
+          </a:effectRef>
+          <a:fontRef idx="minor">
+            <a:schemeClr val="tx1"/>
+          </a:fontRef>
+        </p:style>
+      </p:cxnSp>
+      <p:cxnSp>
+        <p:nvCxnSpPr>
+          <p:cNvPr id="16" name="Straight Arrow Connector 15">
+            <a:extLst>
+              <a:ext uri="{FF2B5EF4-FFF2-40B4-BE49-F238E27FC236}">
+                <a16:creationId xmlns:a16="http://schemas.microsoft.com/office/drawing/2014/main" id="{9826ADD7-2A74-4734-9E38-335C9AD34E2D}"/>
+              </a:ext>
+            </a:extLst>
+          </p:cNvPr>
+          <p:cNvCxnSpPr>
+            <a:cxnSpLocks/>
+          </p:cNvCxnSpPr>
+          <p:nvPr/>
+        </p:nvCxnSpPr>
+        <p:spPr>
+          <a:xfrm flipV="1">
+            <a:off x="4117902" y="1771651"/>
+            <a:ext cx="0" cy="484025"/>
+          </a:xfrm>
+          <a:prstGeom prst="straightConnector1">
+            <a:avLst/>
+          </a:prstGeom>
+          <a:ln w="19050" cap="flat" cmpd="sng" algn="ctr">
+            <a:solidFill>
+              <a:schemeClr val="dk1"/>
+            </a:solidFill>
+            <a:prstDash val="solid"/>
+            <a:round/>
+            <a:headEnd type="triangle" w="lg" len="med"/>
+            <a:tailEnd type="triangle" w="lg" len="med"/>
+          </a:ln>
+        </p:spPr>
+        <p:style>
+          <a:lnRef idx="0">
+            <a:scrgbClr r="0" g="0" b="0"/>
+          </a:lnRef>
+          <a:fillRef idx="0">
+            <a:scrgbClr r="0" g="0" b="0"/>
+          </a:fillRef>
+          <a:effectRef idx="0">
+            <a:scrgbClr r="0" g="0" b="0"/>
+          </a:effectRef>
+          <a:fontRef idx="minor">
+            <a:schemeClr val="tx1"/>
+          </a:fontRef>
+        </p:style>
+      </p:cxnSp>
+    </p:spTree>
+    <p:extLst>
+      <p:ext uri="{BB962C8B-B14F-4D97-AF65-F5344CB8AC3E}">
+        <p14:creationId xmlns:p14="http://schemas.microsoft.com/office/powerpoint/2010/main" val="1592621235"/>
+      </p:ext>
+    </p:extLst>
+  </p:cSld>
+  <p:clrMapOvr>
+    <a:masterClrMapping/>
+  </p:clrMapOvr>
+</p:sld>
+</file>
+
 <file path=ppt/theme/theme1.xml><?xml version="1.0" encoding="utf-8"?>
 <a:theme xmlns:a="http://schemas.openxmlformats.org/drawingml/2006/main" name="Office Theme">
   <a:themeElements>

</xml_diff>